<commit_message>
doc: added notes (update)
</commit_message>
<xml_diff>
--- a/notes.pptx
+++ b/notes.pptx
@@ -28,6 +28,15 @@
     <p:sldId id="279" r:id="rId22"/>
     <p:sldId id="278" r:id="rId23"/>
     <p:sldId id="275" r:id="rId24"/>
+    <p:sldId id="280" r:id="rId25"/>
+    <p:sldId id="281" r:id="rId26"/>
+    <p:sldId id="285" r:id="rId27"/>
+    <p:sldId id="282" r:id="rId28"/>
+    <p:sldId id="283" r:id="rId29"/>
+    <p:sldId id="284" r:id="rId30"/>
+    <p:sldId id="286" r:id="rId31"/>
+    <p:sldId id="287" r:id="rId32"/>
+    <p:sldId id="288" r:id="rId33"/>
   </p:sldIdLst>
   <p:sldSz cx="12192000" cy="6858000"/>
   <p:notesSz cx="6858000" cy="9144000"/>
@@ -283,7 +292,7 @@
           <a:p>
             <a:fld id="{92E32824-3CB4-452C-8CEB-79ECB12FA891}" type="datetimeFigureOut">
               <a:rPr lang="fr-FR" smtClean="0"/>
-              <a:t>09/03/2021</a:t>
+              <a:t>10/03/2021</a:t>
             </a:fld>
             <a:endParaRPr lang="fr-FR"/>
           </a:p>
@@ -483,7 +492,7 @@
           <a:p>
             <a:fld id="{92E32824-3CB4-452C-8CEB-79ECB12FA891}" type="datetimeFigureOut">
               <a:rPr lang="fr-FR" smtClean="0"/>
-              <a:t>09/03/2021</a:t>
+              <a:t>10/03/2021</a:t>
             </a:fld>
             <a:endParaRPr lang="fr-FR"/>
           </a:p>
@@ -693,7 +702,7 @@
           <a:p>
             <a:fld id="{92E32824-3CB4-452C-8CEB-79ECB12FA891}" type="datetimeFigureOut">
               <a:rPr lang="fr-FR" smtClean="0"/>
-              <a:t>09/03/2021</a:t>
+              <a:t>10/03/2021</a:t>
             </a:fld>
             <a:endParaRPr lang="fr-FR"/>
           </a:p>
@@ -893,7 +902,7 @@
           <a:p>
             <a:fld id="{92E32824-3CB4-452C-8CEB-79ECB12FA891}" type="datetimeFigureOut">
               <a:rPr lang="fr-FR" smtClean="0"/>
-              <a:t>09/03/2021</a:t>
+              <a:t>10/03/2021</a:t>
             </a:fld>
             <a:endParaRPr lang="fr-FR"/>
           </a:p>
@@ -1169,7 +1178,7 @@
           <a:p>
             <a:fld id="{92E32824-3CB4-452C-8CEB-79ECB12FA891}" type="datetimeFigureOut">
               <a:rPr lang="fr-FR" smtClean="0"/>
-              <a:t>09/03/2021</a:t>
+              <a:t>10/03/2021</a:t>
             </a:fld>
             <a:endParaRPr lang="fr-FR"/>
           </a:p>
@@ -1437,7 +1446,7 @@
           <a:p>
             <a:fld id="{92E32824-3CB4-452C-8CEB-79ECB12FA891}" type="datetimeFigureOut">
               <a:rPr lang="fr-FR" smtClean="0"/>
-              <a:t>09/03/2021</a:t>
+              <a:t>10/03/2021</a:t>
             </a:fld>
             <a:endParaRPr lang="fr-FR"/>
           </a:p>
@@ -1852,7 +1861,7 @@
           <a:p>
             <a:fld id="{92E32824-3CB4-452C-8CEB-79ECB12FA891}" type="datetimeFigureOut">
               <a:rPr lang="fr-FR" smtClean="0"/>
-              <a:t>09/03/2021</a:t>
+              <a:t>10/03/2021</a:t>
             </a:fld>
             <a:endParaRPr lang="fr-FR"/>
           </a:p>
@@ -1994,7 +2003,7 @@
           <a:p>
             <a:fld id="{92E32824-3CB4-452C-8CEB-79ECB12FA891}" type="datetimeFigureOut">
               <a:rPr lang="fr-FR" smtClean="0"/>
-              <a:t>09/03/2021</a:t>
+              <a:t>10/03/2021</a:t>
             </a:fld>
             <a:endParaRPr lang="fr-FR"/>
           </a:p>
@@ -2107,7 +2116,7 @@
           <a:p>
             <a:fld id="{92E32824-3CB4-452C-8CEB-79ECB12FA891}" type="datetimeFigureOut">
               <a:rPr lang="fr-FR" smtClean="0"/>
-              <a:t>09/03/2021</a:t>
+              <a:t>10/03/2021</a:t>
             </a:fld>
             <a:endParaRPr lang="fr-FR"/>
           </a:p>
@@ -2420,7 +2429,7 @@
           <a:p>
             <a:fld id="{92E32824-3CB4-452C-8CEB-79ECB12FA891}" type="datetimeFigureOut">
               <a:rPr lang="fr-FR" smtClean="0"/>
-              <a:t>09/03/2021</a:t>
+              <a:t>10/03/2021</a:t>
             </a:fld>
             <a:endParaRPr lang="fr-FR"/>
           </a:p>
@@ -2709,7 +2718,7 @@
           <a:p>
             <a:fld id="{92E32824-3CB4-452C-8CEB-79ECB12FA891}" type="datetimeFigureOut">
               <a:rPr lang="fr-FR" smtClean="0"/>
-              <a:t>09/03/2021</a:t>
+              <a:t>10/03/2021</a:t>
             </a:fld>
             <a:endParaRPr lang="fr-FR"/>
           </a:p>
@@ -2952,7 +2961,7 @@
           <a:p>
             <a:fld id="{92E32824-3CB4-452C-8CEB-79ECB12FA891}" type="datetimeFigureOut">
               <a:rPr lang="fr-FR" smtClean="0"/>
-              <a:t>09/03/2021</a:t>
+              <a:t>10/03/2021</a:t>
             </a:fld>
             <a:endParaRPr lang="fr-FR"/>
           </a:p>
@@ -4239,15 +4248,15 @@
         </p:spPr>
         <p:style>
           <a:lnRef idx="2">
-            <a:schemeClr val="accent1">
+            <a:schemeClr val="accent6">
               <a:shade val="50000"/>
             </a:schemeClr>
           </a:lnRef>
           <a:fillRef idx="1">
-            <a:schemeClr val="accent1"/>
+            <a:schemeClr val="accent6"/>
           </a:fillRef>
           <a:effectRef idx="0">
-            <a:schemeClr val="accent1"/>
+            <a:schemeClr val="accent6"/>
           </a:effectRef>
           <a:fontRef idx="minor">
             <a:schemeClr val="lt1"/>
@@ -7564,6 +7573,294 @@
           </a:fontRef>
         </p:style>
       </p:cxnSp>
+      <p:sp>
+        <p:nvSpPr>
+          <p:cNvPr id="3" name="Rectangle 2">
+            <a:extLst>
+              <a:ext uri="{FF2B5EF4-FFF2-40B4-BE49-F238E27FC236}">
+                <a16:creationId xmlns:a16="http://schemas.microsoft.com/office/drawing/2014/main" id="{F941684A-6AA3-48B9-A89C-B459672A69F0}"/>
+              </a:ext>
+            </a:extLst>
+          </p:cNvPr>
+          <p:cNvSpPr/>
+          <p:nvPr/>
+        </p:nvSpPr>
+        <p:spPr>
+          <a:xfrm>
+            <a:off x="3914213" y="5807208"/>
+            <a:ext cx="1676400" cy="697004"/>
+          </a:xfrm>
+          <a:prstGeom prst="rect">
+            <a:avLst/>
+          </a:prstGeom>
+        </p:spPr>
+        <p:style>
+          <a:lnRef idx="2">
+            <a:schemeClr val="accent1">
+              <a:shade val="50000"/>
+            </a:schemeClr>
+          </a:lnRef>
+          <a:fillRef idx="1">
+            <a:schemeClr val="accent1"/>
+          </a:fillRef>
+          <a:effectRef idx="0">
+            <a:schemeClr val="accent1"/>
+          </a:effectRef>
+          <a:fontRef idx="minor">
+            <a:schemeClr val="lt1"/>
+          </a:fontRef>
+        </p:style>
+        <p:txBody>
+          <a:bodyPr rtlCol="0" anchor="ctr"/>
+          <a:lstStyle/>
+          <a:p>
+            <a:pPr algn="ctr"/>
+            <a:r>
+              <a:rPr lang="fr-FR" dirty="0"/>
+              <a:t>Widget</a:t>
+            </a:r>
+          </a:p>
+        </p:txBody>
+      </p:sp>
+      <p:sp>
+        <p:nvSpPr>
+          <p:cNvPr id="13" name="Oval 12">
+            <a:extLst>
+              <a:ext uri="{FF2B5EF4-FFF2-40B4-BE49-F238E27FC236}">
+                <a16:creationId xmlns:a16="http://schemas.microsoft.com/office/drawing/2014/main" id="{139549A6-4361-4C26-9E24-37E19E5CC860}"/>
+              </a:ext>
+            </a:extLst>
+          </p:cNvPr>
+          <p:cNvSpPr/>
+          <p:nvPr/>
+        </p:nvSpPr>
+        <p:spPr>
+          <a:xfrm>
+            <a:off x="7158317" y="5879708"/>
+            <a:ext cx="1761565" cy="834988"/>
+          </a:xfrm>
+          <a:prstGeom prst="ellipse">
+            <a:avLst/>
+          </a:prstGeom>
+        </p:spPr>
+        <p:style>
+          <a:lnRef idx="2">
+            <a:schemeClr val="accent4">
+              <a:shade val="50000"/>
+            </a:schemeClr>
+          </a:lnRef>
+          <a:fillRef idx="1">
+            <a:schemeClr val="accent4"/>
+          </a:fillRef>
+          <a:effectRef idx="0">
+            <a:schemeClr val="accent4"/>
+          </a:effectRef>
+          <a:fontRef idx="minor">
+            <a:schemeClr val="lt1"/>
+          </a:fontRef>
+        </p:style>
+        <p:txBody>
+          <a:bodyPr rtlCol="0" anchor="ctr"/>
+          <a:lstStyle/>
+          <a:p>
+            <a:pPr algn="ctr"/>
+            <a:r>
+              <a:rPr lang="fr-FR" dirty="0"/>
+              <a:t>Autofocus</a:t>
+            </a:r>
+          </a:p>
+        </p:txBody>
+      </p:sp>
+      <p:cxnSp>
+        <p:nvCxnSpPr>
+          <p:cNvPr id="25" name="Straight Arrow Connector 24">
+            <a:extLst>
+              <a:ext uri="{FF2B5EF4-FFF2-40B4-BE49-F238E27FC236}">
+                <a16:creationId xmlns:a16="http://schemas.microsoft.com/office/drawing/2014/main" id="{76B566DD-53F3-48AF-B63F-2B02175D7632}"/>
+              </a:ext>
+            </a:extLst>
+          </p:cNvPr>
+          <p:cNvCxnSpPr>
+            <a:cxnSpLocks/>
+            <a:stCxn id="13" idx="2"/>
+            <a:endCxn id="3" idx="3"/>
+          </p:cNvCxnSpPr>
+          <p:nvPr/>
+        </p:nvCxnSpPr>
+        <p:spPr>
+          <a:xfrm flipH="1" flipV="1">
+            <a:off x="5590613" y="6155710"/>
+            <a:ext cx="1567704" cy="141492"/>
+          </a:xfrm>
+          <a:prstGeom prst="straightConnector1">
+            <a:avLst/>
+          </a:prstGeom>
+          <a:ln w="76200">
+            <a:solidFill>
+              <a:schemeClr val="accent1"/>
+            </a:solidFill>
+            <a:headEnd type="none" w="med" len="med"/>
+            <a:tailEnd type="triangle"/>
+          </a:ln>
+        </p:spPr>
+        <p:style>
+          <a:lnRef idx="1">
+            <a:schemeClr val="accent1"/>
+          </a:lnRef>
+          <a:fillRef idx="0">
+            <a:schemeClr val="accent1"/>
+          </a:fillRef>
+          <a:effectRef idx="0">
+            <a:schemeClr val="accent1"/>
+          </a:effectRef>
+          <a:fontRef idx="minor">
+            <a:schemeClr val="tx1"/>
+          </a:fontRef>
+        </p:style>
+      </p:cxnSp>
+      <p:cxnSp>
+        <p:nvCxnSpPr>
+          <p:cNvPr id="34" name="Straight Arrow Connector 33">
+            <a:extLst>
+              <a:ext uri="{FF2B5EF4-FFF2-40B4-BE49-F238E27FC236}">
+                <a16:creationId xmlns:a16="http://schemas.microsoft.com/office/drawing/2014/main" id="{56550187-D648-4E3F-8F52-B3E5992EC8FD}"/>
+              </a:ext>
+            </a:extLst>
+          </p:cNvPr>
+          <p:cNvCxnSpPr>
+            <a:stCxn id="3" idx="1"/>
+            <a:endCxn id="35" idx="3"/>
+          </p:cNvCxnSpPr>
+          <p:nvPr/>
+        </p:nvCxnSpPr>
+        <p:spPr>
+          <a:xfrm flipH="1" flipV="1">
+            <a:off x="2443238" y="4049486"/>
+            <a:ext cx="1470975" cy="2106224"/>
+          </a:xfrm>
+          <a:prstGeom prst="straightConnector1">
+            <a:avLst/>
+          </a:prstGeom>
+          <a:ln w="76200">
+            <a:solidFill>
+              <a:schemeClr val="accent1"/>
+            </a:solidFill>
+            <a:prstDash val="sysDash"/>
+            <a:headEnd type="none" w="med" len="med"/>
+            <a:tailEnd type="triangle"/>
+          </a:ln>
+        </p:spPr>
+        <p:style>
+          <a:lnRef idx="1">
+            <a:schemeClr val="accent1"/>
+          </a:lnRef>
+          <a:fillRef idx="0">
+            <a:schemeClr val="accent1"/>
+          </a:fillRef>
+          <a:effectRef idx="0">
+            <a:schemeClr val="accent1"/>
+          </a:effectRef>
+          <a:fontRef idx="minor">
+            <a:schemeClr val="tx1"/>
+          </a:fontRef>
+        </p:style>
+      </p:cxnSp>
+      <p:sp>
+        <p:nvSpPr>
+          <p:cNvPr id="50" name="Oval 49">
+            <a:extLst>
+              <a:ext uri="{FF2B5EF4-FFF2-40B4-BE49-F238E27FC236}">
+                <a16:creationId xmlns:a16="http://schemas.microsoft.com/office/drawing/2014/main" id="{B773218D-95F9-49F8-ABFA-4DBF9CB034E9}"/>
+              </a:ext>
+            </a:extLst>
+          </p:cNvPr>
+          <p:cNvSpPr/>
+          <p:nvPr/>
+        </p:nvSpPr>
+        <p:spPr>
+          <a:xfrm>
+            <a:off x="7337611" y="4817894"/>
+            <a:ext cx="1761565" cy="834988"/>
+          </a:xfrm>
+          <a:prstGeom prst="ellipse">
+            <a:avLst/>
+          </a:prstGeom>
+        </p:spPr>
+        <p:style>
+          <a:lnRef idx="2">
+            <a:schemeClr val="accent2">
+              <a:shade val="50000"/>
+            </a:schemeClr>
+          </a:lnRef>
+          <a:fillRef idx="1">
+            <a:schemeClr val="accent2"/>
+          </a:fillRef>
+          <a:effectRef idx="0">
+            <a:schemeClr val="accent2"/>
+          </a:effectRef>
+          <a:fontRef idx="minor">
+            <a:schemeClr val="lt1"/>
+          </a:fontRef>
+        </p:style>
+        <p:txBody>
+          <a:bodyPr rtlCol="0" anchor="ctr"/>
+          <a:lstStyle/>
+          <a:p>
+            <a:pPr algn="ctr"/>
+            <a:r>
+              <a:rPr lang="fr-FR" dirty="0" err="1"/>
+              <a:t>Ellipsis</a:t>
+            </a:r>
+            <a:endParaRPr lang="fr-FR" dirty="0"/>
+          </a:p>
+        </p:txBody>
+      </p:sp>
+      <p:cxnSp>
+        <p:nvCxnSpPr>
+          <p:cNvPr id="52" name="Straight Arrow Connector 51">
+            <a:extLst>
+              <a:ext uri="{FF2B5EF4-FFF2-40B4-BE49-F238E27FC236}">
+                <a16:creationId xmlns:a16="http://schemas.microsoft.com/office/drawing/2014/main" id="{0BD13EC8-5D63-447A-A289-EFC0CFD28006}"/>
+              </a:ext>
+            </a:extLst>
+          </p:cNvPr>
+          <p:cNvCxnSpPr>
+            <a:stCxn id="50" idx="2"/>
+            <a:endCxn id="3" idx="3"/>
+          </p:cNvCxnSpPr>
+          <p:nvPr/>
+        </p:nvCxnSpPr>
+        <p:spPr>
+          <a:xfrm flipH="1">
+            <a:off x="5590613" y="5235388"/>
+            <a:ext cx="1746998" cy="920322"/>
+          </a:xfrm>
+          <a:prstGeom prst="straightConnector1">
+            <a:avLst/>
+          </a:prstGeom>
+          <a:ln w="76200">
+            <a:solidFill>
+              <a:schemeClr val="accent1"/>
+            </a:solidFill>
+            <a:headEnd type="none" w="med" len="med"/>
+            <a:tailEnd type="triangle"/>
+          </a:ln>
+        </p:spPr>
+        <p:style>
+          <a:lnRef idx="1">
+            <a:schemeClr val="accent1"/>
+          </a:lnRef>
+          <a:fillRef idx="0">
+            <a:schemeClr val="accent1"/>
+          </a:fillRef>
+          <a:effectRef idx="0">
+            <a:schemeClr val="accent1"/>
+          </a:effectRef>
+          <a:fontRef idx="minor">
+            <a:schemeClr val="tx1"/>
+          </a:fontRef>
+        </p:style>
+      </p:cxnSp>
     </p:spTree>
     <p:extLst>
       <p:ext uri="{BB962C8B-B14F-4D97-AF65-F5344CB8AC3E}">
@@ -8304,6 +8601,3306 @@
 </p:sld>
 </file>
 
+<file path=ppt/slides/slide24.xml><?xml version="1.0" encoding="utf-8"?>
+<p:sld xmlns:a="http://schemas.openxmlformats.org/drawingml/2006/main" xmlns:r="http://schemas.openxmlformats.org/officeDocument/2006/relationships" xmlns:p="http://schemas.openxmlformats.org/presentationml/2006/main">
+  <p:cSld>
+    <p:spTree>
+      <p:nvGrpSpPr>
+        <p:cNvPr id="1" name=""/>
+        <p:cNvGrpSpPr/>
+        <p:nvPr/>
+      </p:nvGrpSpPr>
+      <p:grpSpPr>
+        <a:xfrm>
+          <a:off x="0" y="0"/>
+          <a:ext cx="0" cy="0"/>
+          <a:chOff x="0" y="0"/>
+          <a:chExt cx="0" cy="0"/>
+        </a:xfrm>
+      </p:grpSpPr>
+      <p:sp>
+        <p:nvSpPr>
+          <p:cNvPr id="2" name="Title 1">
+            <a:extLst>
+              <a:ext uri="{FF2B5EF4-FFF2-40B4-BE49-F238E27FC236}">
+                <a16:creationId xmlns:a16="http://schemas.microsoft.com/office/drawing/2014/main" id="{AEAA571A-BD90-4808-A5B8-F535557ED77C}"/>
+              </a:ext>
+            </a:extLst>
+          </p:cNvPr>
+          <p:cNvSpPr>
+            <a:spLocks noGrp="1"/>
+          </p:cNvSpPr>
+          <p:nvPr>
+            <p:ph type="title"/>
+          </p:nvPr>
+        </p:nvSpPr>
+        <p:spPr/>
+        <p:txBody>
+          <a:bodyPr/>
+          <a:lstStyle/>
+          <a:p>
+            <a:r>
+              <a:rPr lang="fr-FR" dirty="0"/>
+              <a:t>TODO </a:t>
+            </a:r>
+            <a:r>
+              <a:rPr lang="fr-FR" dirty="0" err="1"/>
+              <a:t>list</a:t>
+            </a:r>
+            <a:r>
+              <a:rPr lang="fr-FR" dirty="0"/>
+              <a:t> 3eme jour</a:t>
+            </a:r>
+          </a:p>
+        </p:txBody>
+      </p:sp>
+      <p:sp>
+        <p:nvSpPr>
+          <p:cNvPr id="3" name="Content Placeholder 2">
+            <a:extLst>
+              <a:ext uri="{FF2B5EF4-FFF2-40B4-BE49-F238E27FC236}">
+                <a16:creationId xmlns:a16="http://schemas.microsoft.com/office/drawing/2014/main" id="{F98E73C5-6140-4FF8-8065-134228AFBE34}"/>
+              </a:ext>
+            </a:extLst>
+          </p:cNvPr>
+          <p:cNvSpPr>
+            <a:spLocks noGrp="1"/>
+          </p:cNvSpPr>
+          <p:nvPr>
+            <p:ph idx="1"/>
+          </p:nvPr>
+        </p:nvSpPr>
+        <p:spPr/>
+        <p:txBody>
+          <a:bodyPr/>
+          <a:lstStyle/>
+          <a:p>
+            <a:r>
+              <a:rPr lang="fr-FR" dirty="0">
+                <a:highlight>
+                  <a:srgbClr val="FFFF00"/>
+                </a:highlight>
+              </a:rPr>
+              <a:t>HTTP (relation avec </a:t>
+            </a:r>
+            <a:r>
+              <a:rPr lang="fr-FR" dirty="0" err="1">
+                <a:highlight>
+                  <a:srgbClr val="FFFF00"/>
+                </a:highlight>
+              </a:rPr>
+              <a:t>back-end</a:t>
+            </a:r>
+            <a:r>
+              <a:rPr lang="fr-FR" dirty="0">
+                <a:highlight>
+                  <a:srgbClr val="FFFF00"/>
+                </a:highlight>
+              </a:rPr>
+              <a:t>)</a:t>
+            </a:r>
+          </a:p>
+          <a:p>
+            <a:pPr lvl="1"/>
+            <a:r>
+              <a:rPr lang="fr-FR" dirty="0">
+                <a:highlight>
+                  <a:srgbClr val="FFFF00"/>
+                </a:highlight>
+              </a:rPr>
+              <a:t>CORS</a:t>
+            </a:r>
+          </a:p>
+          <a:p>
+            <a:pPr lvl="1"/>
+            <a:r>
+              <a:rPr lang="fr-FR" dirty="0">
+                <a:highlight>
+                  <a:srgbClr val="FFFF00"/>
+                </a:highlight>
+              </a:rPr>
+              <a:t>Injection d’un service</a:t>
+            </a:r>
+          </a:p>
+          <a:p>
+            <a:r>
+              <a:rPr lang="fr-FR" dirty="0">
+                <a:highlight>
+                  <a:srgbClr val="FFFF00"/>
+                </a:highlight>
+              </a:rPr>
+              <a:t>Directive (en </a:t>
+            </a:r>
+            <a:r>
+              <a:rPr lang="fr-FR" dirty="0" err="1">
+                <a:highlight>
+                  <a:srgbClr val="FFFF00"/>
+                </a:highlight>
+              </a:rPr>
+              <a:t>ecrire</a:t>
+            </a:r>
+            <a:r>
+              <a:rPr lang="fr-FR" dirty="0">
+                <a:highlight>
+                  <a:srgbClr val="FFFF00"/>
+                </a:highlight>
+              </a:rPr>
+              <a:t> une)</a:t>
+            </a:r>
+          </a:p>
+          <a:p>
+            <a:r>
+              <a:rPr lang="fr-FR" dirty="0">
+                <a:highlight>
+                  <a:srgbClr val="FFFF00"/>
+                </a:highlight>
+              </a:rPr>
+              <a:t>Pipe (en </a:t>
+            </a:r>
+            <a:r>
+              <a:rPr lang="fr-FR" dirty="0" err="1">
+                <a:highlight>
+                  <a:srgbClr val="FFFF00"/>
+                </a:highlight>
+              </a:rPr>
+              <a:t>ecrire</a:t>
+            </a:r>
+            <a:r>
+              <a:rPr lang="fr-FR" dirty="0">
+                <a:highlight>
+                  <a:srgbClr val="FFFF00"/>
+                </a:highlight>
+              </a:rPr>
+              <a:t> un)</a:t>
+            </a:r>
+          </a:p>
+          <a:p>
+            <a:r>
+              <a:rPr lang="fr-FR" dirty="0" err="1">
+                <a:highlight>
+                  <a:srgbClr val="FFFF00"/>
+                </a:highlight>
+              </a:rPr>
+              <a:t>Ng</a:t>
+            </a:r>
+            <a:r>
+              <a:rPr lang="fr-FR" dirty="0">
+                <a:highlight>
+                  <a:srgbClr val="FFFF00"/>
+                </a:highlight>
+              </a:rPr>
+              <a:t> test</a:t>
+            </a:r>
+          </a:p>
+          <a:p>
+            <a:r>
+              <a:rPr lang="fr-FR" dirty="0" err="1"/>
+              <a:t>Ng</a:t>
+            </a:r>
+            <a:r>
+              <a:rPr lang="fr-FR" dirty="0"/>
+              <a:t> e2e</a:t>
+            </a:r>
+          </a:p>
+          <a:p>
+            <a:r>
+              <a:rPr lang="fr-FR" dirty="0" err="1"/>
+              <a:t>Ng</a:t>
+            </a:r>
+            <a:r>
+              <a:rPr lang="fr-FR" dirty="0"/>
+              <a:t> </a:t>
+            </a:r>
+            <a:r>
+              <a:rPr lang="fr-FR" dirty="0" err="1"/>
+              <a:t>build</a:t>
+            </a:r>
+            <a:r>
+              <a:rPr lang="fr-FR" dirty="0"/>
+              <a:t> --prod</a:t>
+            </a:r>
+          </a:p>
+        </p:txBody>
+      </p:sp>
+    </p:spTree>
+    <p:extLst>
+      <p:ext uri="{BB962C8B-B14F-4D97-AF65-F5344CB8AC3E}">
+        <p14:creationId xmlns:p14="http://schemas.microsoft.com/office/powerpoint/2010/main" val="1880126246"/>
+      </p:ext>
+    </p:extLst>
+  </p:cSld>
+  <p:clrMapOvr>
+    <a:masterClrMapping/>
+  </p:clrMapOvr>
+</p:sld>
+</file>
+
+<file path=ppt/slides/slide25.xml><?xml version="1.0" encoding="utf-8"?>
+<p:sld xmlns:a="http://schemas.openxmlformats.org/drawingml/2006/main" xmlns:r="http://schemas.openxmlformats.org/officeDocument/2006/relationships" xmlns:p="http://schemas.openxmlformats.org/presentationml/2006/main">
+  <p:cSld>
+    <p:spTree>
+      <p:nvGrpSpPr>
+        <p:cNvPr id="1" name=""/>
+        <p:cNvGrpSpPr/>
+        <p:nvPr/>
+      </p:nvGrpSpPr>
+      <p:grpSpPr>
+        <a:xfrm>
+          <a:off x="0" y="0"/>
+          <a:ext cx="0" cy="0"/>
+          <a:chOff x="0" y="0"/>
+          <a:chExt cx="0" cy="0"/>
+        </a:xfrm>
+      </p:grpSpPr>
+      <p:sp>
+        <p:nvSpPr>
+          <p:cNvPr id="4" name="Rectangle 3">
+            <a:extLst>
+              <a:ext uri="{FF2B5EF4-FFF2-40B4-BE49-F238E27FC236}">
+                <a16:creationId xmlns:a16="http://schemas.microsoft.com/office/drawing/2014/main" id="{DA5E3CE4-274D-452C-A6CA-4337EE726B0F}"/>
+              </a:ext>
+            </a:extLst>
+          </p:cNvPr>
+          <p:cNvSpPr/>
+          <p:nvPr/>
+        </p:nvSpPr>
+        <p:spPr>
+          <a:xfrm>
+            <a:off x="672353" y="2223247"/>
+            <a:ext cx="1335741" cy="1344706"/>
+          </a:xfrm>
+          <a:prstGeom prst="rect">
+            <a:avLst/>
+          </a:prstGeom>
+        </p:spPr>
+        <p:style>
+          <a:lnRef idx="2">
+            <a:schemeClr val="accent1">
+              <a:shade val="50000"/>
+            </a:schemeClr>
+          </a:lnRef>
+          <a:fillRef idx="1">
+            <a:schemeClr val="accent1"/>
+          </a:fillRef>
+          <a:effectRef idx="0">
+            <a:schemeClr val="accent1"/>
+          </a:effectRef>
+          <a:fontRef idx="minor">
+            <a:schemeClr val="lt1"/>
+          </a:fontRef>
+        </p:style>
+        <p:txBody>
+          <a:bodyPr rtlCol="0" anchor="ctr"/>
+          <a:lstStyle/>
+          <a:p>
+            <a:pPr algn="ctr"/>
+            <a:endParaRPr lang="fr-FR"/>
+          </a:p>
+        </p:txBody>
+      </p:sp>
+      <p:sp>
+        <p:nvSpPr>
+          <p:cNvPr id="6" name="TextBox 5">
+            <a:extLst>
+              <a:ext uri="{FF2B5EF4-FFF2-40B4-BE49-F238E27FC236}">
+                <a16:creationId xmlns:a16="http://schemas.microsoft.com/office/drawing/2014/main" id="{4A689432-C8D2-4E66-A6B0-14C8FC978BAC}"/>
+              </a:ext>
+            </a:extLst>
+          </p:cNvPr>
+          <p:cNvSpPr txBox="1"/>
+          <p:nvPr/>
+        </p:nvSpPr>
+        <p:spPr>
+          <a:xfrm>
+            <a:off x="672353" y="1689847"/>
+            <a:ext cx="1269322" cy="369332"/>
+          </a:xfrm>
+          <a:prstGeom prst="rect">
+            <a:avLst/>
+          </a:prstGeom>
+          <a:noFill/>
+        </p:spPr>
+        <p:txBody>
+          <a:bodyPr wrap="none" rtlCol="0">
+            <a:spAutoFit/>
+          </a:bodyPr>
+          <a:lstStyle/>
+          <a:p>
+            <a:r>
+              <a:rPr lang="fr-FR" dirty="0"/>
+              <a:t>Client HTTP</a:t>
+            </a:r>
+          </a:p>
+        </p:txBody>
+      </p:sp>
+      <p:sp>
+        <p:nvSpPr>
+          <p:cNvPr id="7" name="Rectangle 6">
+            <a:extLst>
+              <a:ext uri="{FF2B5EF4-FFF2-40B4-BE49-F238E27FC236}">
+                <a16:creationId xmlns:a16="http://schemas.microsoft.com/office/drawing/2014/main" id="{A4AE6F98-D072-41DB-8C1C-E207A75F15AB}"/>
+              </a:ext>
+            </a:extLst>
+          </p:cNvPr>
+          <p:cNvSpPr/>
+          <p:nvPr/>
+        </p:nvSpPr>
+        <p:spPr>
+          <a:xfrm>
+            <a:off x="7126941" y="654424"/>
+            <a:ext cx="1667435" cy="1268505"/>
+          </a:xfrm>
+          <a:prstGeom prst="rect">
+            <a:avLst/>
+          </a:prstGeom>
+        </p:spPr>
+        <p:style>
+          <a:lnRef idx="2">
+            <a:schemeClr val="accent1">
+              <a:shade val="50000"/>
+            </a:schemeClr>
+          </a:lnRef>
+          <a:fillRef idx="1">
+            <a:schemeClr val="accent1"/>
+          </a:fillRef>
+          <a:effectRef idx="0">
+            <a:schemeClr val="accent1"/>
+          </a:effectRef>
+          <a:fontRef idx="minor">
+            <a:schemeClr val="lt1"/>
+          </a:fontRef>
+        </p:style>
+        <p:txBody>
+          <a:bodyPr rtlCol="0" anchor="ctr"/>
+          <a:lstStyle/>
+          <a:p>
+            <a:pPr algn="ctr"/>
+            <a:endParaRPr lang="fr-FR"/>
+          </a:p>
+        </p:txBody>
+      </p:sp>
+      <p:sp>
+        <p:nvSpPr>
+          <p:cNvPr id="8" name="TextBox 7">
+            <a:extLst>
+              <a:ext uri="{FF2B5EF4-FFF2-40B4-BE49-F238E27FC236}">
+                <a16:creationId xmlns:a16="http://schemas.microsoft.com/office/drawing/2014/main" id="{BB2304D1-E8DD-4B41-98BC-DF1CF830579D}"/>
+              </a:ext>
+            </a:extLst>
+          </p:cNvPr>
+          <p:cNvSpPr txBox="1"/>
+          <p:nvPr/>
+        </p:nvSpPr>
+        <p:spPr>
+          <a:xfrm>
+            <a:off x="7306235" y="282388"/>
+            <a:ext cx="2566921" cy="369332"/>
+          </a:xfrm>
+          <a:prstGeom prst="rect">
+            <a:avLst/>
+          </a:prstGeom>
+          <a:noFill/>
+        </p:spPr>
+        <p:txBody>
+          <a:bodyPr wrap="none" rtlCol="0">
+            <a:spAutoFit/>
+          </a:bodyPr>
+          <a:lstStyle/>
+          <a:p>
+            <a:r>
+              <a:rPr lang="fr-FR" dirty="0" err="1"/>
+              <a:t>Ng</a:t>
+            </a:r>
+            <a:r>
+              <a:rPr lang="fr-FR" dirty="0"/>
+              <a:t> serve (localhost:4202)</a:t>
+            </a:r>
+          </a:p>
+        </p:txBody>
+      </p:sp>
+      <p:sp>
+        <p:nvSpPr>
+          <p:cNvPr id="9" name="Rectangle 8">
+            <a:extLst>
+              <a:ext uri="{FF2B5EF4-FFF2-40B4-BE49-F238E27FC236}">
+                <a16:creationId xmlns:a16="http://schemas.microsoft.com/office/drawing/2014/main" id="{B4F5021A-4DA4-4EA7-83C6-FB51B171C837}"/>
+              </a:ext>
+            </a:extLst>
+          </p:cNvPr>
+          <p:cNvSpPr/>
+          <p:nvPr/>
+        </p:nvSpPr>
+        <p:spPr>
+          <a:xfrm>
+            <a:off x="7377953" y="4334436"/>
+            <a:ext cx="1667435" cy="1268505"/>
+          </a:xfrm>
+          <a:prstGeom prst="rect">
+            <a:avLst/>
+          </a:prstGeom>
+        </p:spPr>
+        <p:style>
+          <a:lnRef idx="2">
+            <a:schemeClr val="accent1">
+              <a:shade val="50000"/>
+            </a:schemeClr>
+          </a:lnRef>
+          <a:fillRef idx="1">
+            <a:schemeClr val="accent1"/>
+          </a:fillRef>
+          <a:effectRef idx="0">
+            <a:schemeClr val="accent1"/>
+          </a:effectRef>
+          <a:fontRef idx="minor">
+            <a:schemeClr val="lt1"/>
+          </a:fontRef>
+        </p:style>
+        <p:txBody>
+          <a:bodyPr rtlCol="0" anchor="ctr"/>
+          <a:lstStyle/>
+          <a:p>
+            <a:pPr algn="ctr"/>
+            <a:endParaRPr lang="fr-FR"/>
+          </a:p>
+        </p:txBody>
+      </p:sp>
+      <p:sp>
+        <p:nvSpPr>
+          <p:cNvPr id="10" name="TextBox 9">
+            <a:extLst>
+              <a:ext uri="{FF2B5EF4-FFF2-40B4-BE49-F238E27FC236}">
+                <a16:creationId xmlns:a16="http://schemas.microsoft.com/office/drawing/2014/main" id="{4A45E6C4-1B9F-4DAE-9BC7-45BCC1AE7ECD}"/>
+              </a:ext>
+            </a:extLst>
+          </p:cNvPr>
+          <p:cNvSpPr txBox="1"/>
+          <p:nvPr/>
+        </p:nvSpPr>
+        <p:spPr>
+          <a:xfrm>
+            <a:off x="7400365" y="3783106"/>
+            <a:ext cx="1602042" cy="369332"/>
+          </a:xfrm>
+          <a:prstGeom prst="rect">
+            <a:avLst/>
+          </a:prstGeom>
+          <a:noFill/>
+        </p:spPr>
+        <p:txBody>
+          <a:bodyPr wrap="none" rtlCol="0">
+            <a:spAutoFit/>
+          </a:bodyPr>
+          <a:lstStyle/>
+          <a:p>
+            <a:r>
+              <a:rPr lang="fr-FR" dirty="0"/>
+              <a:t>Localhost:3000</a:t>
+            </a:r>
+          </a:p>
+        </p:txBody>
+      </p:sp>
+      <p:sp>
+        <p:nvSpPr>
+          <p:cNvPr id="11" name="Cylinder 10">
+            <a:extLst>
+              <a:ext uri="{FF2B5EF4-FFF2-40B4-BE49-F238E27FC236}">
+                <a16:creationId xmlns:a16="http://schemas.microsoft.com/office/drawing/2014/main" id="{0D81C291-0EDB-4A3C-BBB0-57ED85299770}"/>
+              </a:ext>
+            </a:extLst>
+          </p:cNvPr>
+          <p:cNvSpPr/>
+          <p:nvPr/>
+        </p:nvSpPr>
+        <p:spPr>
+          <a:xfrm>
+            <a:off x="9542929" y="4787153"/>
+            <a:ext cx="2008095" cy="1743635"/>
+          </a:xfrm>
+          <a:prstGeom prst="can">
+            <a:avLst/>
+          </a:prstGeom>
+        </p:spPr>
+        <p:style>
+          <a:lnRef idx="2">
+            <a:schemeClr val="accent1">
+              <a:shade val="50000"/>
+            </a:schemeClr>
+          </a:lnRef>
+          <a:fillRef idx="1">
+            <a:schemeClr val="accent1"/>
+          </a:fillRef>
+          <a:effectRef idx="0">
+            <a:schemeClr val="accent1"/>
+          </a:effectRef>
+          <a:fontRef idx="minor">
+            <a:schemeClr val="lt1"/>
+          </a:fontRef>
+        </p:style>
+        <p:txBody>
+          <a:bodyPr rtlCol="0" anchor="ctr"/>
+          <a:lstStyle/>
+          <a:p>
+            <a:pPr algn="ctr"/>
+            <a:r>
+              <a:rPr lang="fr-FR" dirty="0"/>
+              <a:t>Articles</a:t>
+            </a:r>
+          </a:p>
+        </p:txBody>
+      </p:sp>
+      <p:cxnSp>
+        <p:nvCxnSpPr>
+          <p:cNvPr id="13" name="Straight Arrow Connector 12">
+            <a:extLst>
+              <a:ext uri="{FF2B5EF4-FFF2-40B4-BE49-F238E27FC236}">
+                <a16:creationId xmlns:a16="http://schemas.microsoft.com/office/drawing/2014/main" id="{12224B18-AE57-4597-84D4-AD17067BB68C}"/>
+              </a:ext>
+            </a:extLst>
+          </p:cNvPr>
+          <p:cNvCxnSpPr>
+            <a:stCxn id="9" idx="3"/>
+            <a:endCxn id="11" idx="2"/>
+          </p:cNvCxnSpPr>
+          <p:nvPr/>
+        </p:nvCxnSpPr>
+        <p:spPr>
+          <a:xfrm>
+            <a:off x="9045388" y="4968689"/>
+            <a:ext cx="497541" cy="690282"/>
+          </a:xfrm>
+          <a:prstGeom prst="straightConnector1">
+            <a:avLst/>
+          </a:prstGeom>
+          <a:ln w="76200">
+            <a:solidFill>
+              <a:schemeClr val="accent1"/>
+            </a:solidFill>
+            <a:headEnd type="triangle"/>
+            <a:tailEnd type="triangle"/>
+          </a:ln>
+        </p:spPr>
+        <p:style>
+          <a:lnRef idx="1">
+            <a:schemeClr val="accent1"/>
+          </a:lnRef>
+          <a:fillRef idx="0">
+            <a:schemeClr val="accent1"/>
+          </a:fillRef>
+          <a:effectRef idx="0">
+            <a:schemeClr val="accent1"/>
+          </a:effectRef>
+          <a:fontRef idx="minor">
+            <a:schemeClr val="tx1"/>
+          </a:fontRef>
+        </p:style>
+      </p:cxnSp>
+      <p:cxnSp>
+        <p:nvCxnSpPr>
+          <p:cNvPr id="15" name="Straight Arrow Connector 14">
+            <a:extLst>
+              <a:ext uri="{FF2B5EF4-FFF2-40B4-BE49-F238E27FC236}">
+                <a16:creationId xmlns:a16="http://schemas.microsoft.com/office/drawing/2014/main" id="{CF881EC6-9B52-44B0-8CCC-18B3DFE6C920}"/>
+              </a:ext>
+            </a:extLst>
+          </p:cNvPr>
+          <p:cNvCxnSpPr/>
+          <p:nvPr/>
+        </p:nvCxnSpPr>
+        <p:spPr>
+          <a:xfrm flipV="1">
+            <a:off x="2039471" y="1071282"/>
+            <a:ext cx="5087470" cy="1429871"/>
+          </a:xfrm>
+          <a:prstGeom prst="straightConnector1">
+            <a:avLst/>
+          </a:prstGeom>
+          <a:ln w="76200">
+            <a:solidFill>
+              <a:schemeClr val="accent1"/>
+            </a:solidFill>
+            <a:headEnd type="none" w="med" len="med"/>
+            <a:tailEnd type="triangle"/>
+          </a:ln>
+        </p:spPr>
+        <p:style>
+          <a:lnRef idx="1">
+            <a:schemeClr val="accent1"/>
+          </a:lnRef>
+          <a:fillRef idx="0">
+            <a:schemeClr val="accent1"/>
+          </a:fillRef>
+          <a:effectRef idx="0">
+            <a:schemeClr val="accent1"/>
+          </a:effectRef>
+          <a:fontRef idx="minor">
+            <a:schemeClr val="tx1"/>
+          </a:fontRef>
+        </p:style>
+      </p:cxnSp>
+      <p:cxnSp>
+        <p:nvCxnSpPr>
+          <p:cNvPr id="17" name="Straight Arrow Connector 16">
+            <a:extLst>
+              <a:ext uri="{FF2B5EF4-FFF2-40B4-BE49-F238E27FC236}">
+                <a16:creationId xmlns:a16="http://schemas.microsoft.com/office/drawing/2014/main" id="{2CAE3889-062B-44C9-8163-51350B728056}"/>
+              </a:ext>
+            </a:extLst>
+          </p:cNvPr>
+          <p:cNvCxnSpPr/>
+          <p:nvPr/>
+        </p:nvCxnSpPr>
+        <p:spPr>
+          <a:xfrm flipH="1">
+            <a:off x="2008094" y="1559859"/>
+            <a:ext cx="5118847" cy="1488141"/>
+          </a:xfrm>
+          <a:prstGeom prst="straightConnector1">
+            <a:avLst/>
+          </a:prstGeom>
+          <a:ln w="76200">
+            <a:solidFill>
+              <a:schemeClr val="accent1"/>
+            </a:solidFill>
+            <a:headEnd type="none" w="med" len="med"/>
+            <a:tailEnd type="triangle"/>
+          </a:ln>
+        </p:spPr>
+        <p:style>
+          <a:lnRef idx="1">
+            <a:schemeClr val="accent1"/>
+          </a:lnRef>
+          <a:fillRef idx="0">
+            <a:schemeClr val="accent1"/>
+          </a:fillRef>
+          <a:effectRef idx="0">
+            <a:schemeClr val="accent1"/>
+          </a:effectRef>
+          <a:fontRef idx="minor">
+            <a:schemeClr val="tx1"/>
+          </a:fontRef>
+        </p:style>
+      </p:cxnSp>
+      <p:cxnSp>
+        <p:nvCxnSpPr>
+          <p:cNvPr id="19" name="Straight Arrow Connector 18">
+            <a:extLst>
+              <a:ext uri="{FF2B5EF4-FFF2-40B4-BE49-F238E27FC236}">
+                <a16:creationId xmlns:a16="http://schemas.microsoft.com/office/drawing/2014/main" id="{B731A075-8F52-4D9B-B5DB-BADCD13421DB}"/>
+              </a:ext>
+            </a:extLst>
+          </p:cNvPr>
+          <p:cNvCxnSpPr>
+            <a:cxnSpLocks/>
+          </p:cNvCxnSpPr>
+          <p:nvPr/>
+        </p:nvCxnSpPr>
+        <p:spPr>
+          <a:xfrm>
+            <a:off x="2039471" y="3258671"/>
+            <a:ext cx="5360894" cy="1434353"/>
+          </a:xfrm>
+          <a:prstGeom prst="straightConnector1">
+            <a:avLst/>
+          </a:prstGeom>
+          <a:ln w="76200">
+            <a:solidFill>
+              <a:schemeClr val="accent1"/>
+            </a:solidFill>
+            <a:headEnd type="none" w="med" len="med"/>
+            <a:tailEnd type="triangle"/>
+          </a:ln>
+        </p:spPr>
+        <p:style>
+          <a:lnRef idx="1">
+            <a:schemeClr val="accent1"/>
+          </a:lnRef>
+          <a:fillRef idx="0">
+            <a:schemeClr val="accent1"/>
+          </a:fillRef>
+          <a:effectRef idx="0">
+            <a:schemeClr val="accent1"/>
+          </a:effectRef>
+          <a:fontRef idx="minor">
+            <a:schemeClr val="tx1"/>
+          </a:fontRef>
+        </p:style>
+      </p:cxnSp>
+      <p:cxnSp>
+        <p:nvCxnSpPr>
+          <p:cNvPr id="21" name="Straight Arrow Connector 20">
+            <a:extLst>
+              <a:ext uri="{FF2B5EF4-FFF2-40B4-BE49-F238E27FC236}">
+                <a16:creationId xmlns:a16="http://schemas.microsoft.com/office/drawing/2014/main" id="{7EF35143-0202-40C8-A458-47D7FC026DC5}"/>
+              </a:ext>
+            </a:extLst>
+          </p:cNvPr>
+          <p:cNvCxnSpPr>
+            <a:cxnSpLocks/>
+          </p:cNvCxnSpPr>
+          <p:nvPr/>
+        </p:nvCxnSpPr>
+        <p:spPr>
+          <a:xfrm flipH="1" flipV="1">
+            <a:off x="2008094" y="3424519"/>
+            <a:ext cx="5369859" cy="1730187"/>
+          </a:xfrm>
+          <a:prstGeom prst="straightConnector1">
+            <a:avLst/>
+          </a:prstGeom>
+          <a:ln w="76200">
+            <a:solidFill>
+              <a:schemeClr val="accent1"/>
+            </a:solidFill>
+            <a:headEnd type="none" w="med" len="med"/>
+            <a:tailEnd type="triangle"/>
+          </a:ln>
+        </p:spPr>
+        <p:style>
+          <a:lnRef idx="1">
+            <a:schemeClr val="accent1"/>
+          </a:lnRef>
+          <a:fillRef idx="0">
+            <a:schemeClr val="accent1"/>
+          </a:fillRef>
+          <a:effectRef idx="0">
+            <a:schemeClr val="accent1"/>
+          </a:effectRef>
+          <a:fontRef idx="minor">
+            <a:schemeClr val="tx1"/>
+          </a:fontRef>
+        </p:style>
+      </p:cxnSp>
+      <p:sp>
+        <p:nvSpPr>
+          <p:cNvPr id="22" name="Rectangle 21">
+            <a:extLst>
+              <a:ext uri="{FF2B5EF4-FFF2-40B4-BE49-F238E27FC236}">
+                <a16:creationId xmlns:a16="http://schemas.microsoft.com/office/drawing/2014/main" id="{EFFDFCAE-A188-45B4-9F7F-AEC536E5833E}"/>
+              </a:ext>
+            </a:extLst>
+          </p:cNvPr>
+          <p:cNvSpPr/>
+          <p:nvPr/>
+        </p:nvSpPr>
+        <p:spPr>
+          <a:xfrm>
+            <a:off x="1237130" y="3191435"/>
+            <a:ext cx="941294" cy="519953"/>
+          </a:xfrm>
+          <a:prstGeom prst="rect">
+            <a:avLst/>
+          </a:prstGeom>
+        </p:spPr>
+        <p:style>
+          <a:lnRef idx="2">
+            <a:schemeClr val="accent6">
+              <a:shade val="50000"/>
+            </a:schemeClr>
+          </a:lnRef>
+          <a:fillRef idx="1">
+            <a:schemeClr val="accent6"/>
+          </a:fillRef>
+          <a:effectRef idx="0">
+            <a:schemeClr val="accent6"/>
+          </a:effectRef>
+          <a:fontRef idx="minor">
+            <a:schemeClr val="lt1"/>
+          </a:fontRef>
+        </p:style>
+        <p:txBody>
+          <a:bodyPr rtlCol="0" anchor="ctr"/>
+          <a:lstStyle/>
+          <a:p>
+            <a:pPr algn="ctr"/>
+            <a:r>
+              <a:rPr lang="fr-FR" dirty="0"/>
+              <a:t>CORS</a:t>
+            </a:r>
+          </a:p>
+        </p:txBody>
+      </p:sp>
+      <p:sp>
+        <p:nvSpPr>
+          <p:cNvPr id="23" name="Rectangle 22">
+            <a:extLst>
+              <a:ext uri="{FF2B5EF4-FFF2-40B4-BE49-F238E27FC236}">
+                <a16:creationId xmlns:a16="http://schemas.microsoft.com/office/drawing/2014/main" id="{230D7CC2-8BD0-4EF0-B86A-ED747090CFC1}"/>
+              </a:ext>
+            </a:extLst>
+          </p:cNvPr>
+          <p:cNvSpPr/>
+          <p:nvPr/>
+        </p:nvSpPr>
+        <p:spPr>
+          <a:xfrm>
+            <a:off x="6866965" y="5387790"/>
+            <a:ext cx="1272988" cy="791596"/>
+          </a:xfrm>
+          <a:prstGeom prst="rect">
+            <a:avLst/>
+          </a:prstGeom>
+        </p:spPr>
+        <p:style>
+          <a:lnRef idx="2">
+            <a:schemeClr val="accent3">
+              <a:shade val="50000"/>
+            </a:schemeClr>
+          </a:lnRef>
+          <a:fillRef idx="1">
+            <a:schemeClr val="accent3"/>
+          </a:fillRef>
+          <a:effectRef idx="0">
+            <a:schemeClr val="accent3"/>
+          </a:effectRef>
+          <a:fontRef idx="minor">
+            <a:schemeClr val="lt1"/>
+          </a:fontRef>
+        </p:style>
+        <p:txBody>
+          <a:bodyPr rtlCol="0" anchor="ctr"/>
+          <a:lstStyle/>
+          <a:p>
+            <a:pPr algn="ctr"/>
+            <a:r>
+              <a:rPr lang="fr-FR" dirty="0"/>
+              <a:t>Autoriser CORS</a:t>
+            </a:r>
+          </a:p>
+        </p:txBody>
+      </p:sp>
+    </p:spTree>
+    <p:extLst>
+      <p:ext uri="{BB962C8B-B14F-4D97-AF65-F5344CB8AC3E}">
+        <p14:creationId xmlns:p14="http://schemas.microsoft.com/office/powerpoint/2010/main" val="2129148307"/>
+      </p:ext>
+    </p:extLst>
+  </p:cSld>
+  <p:clrMapOvr>
+    <a:masterClrMapping/>
+  </p:clrMapOvr>
+</p:sld>
+</file>
+
+<file path=ppt/slides/slide26.xml><?xml version="1.0" encoding="utf-8"?>
+<p:sld xmlns:a="http://schemas.openxmlformats.org/drawingml/2006/main" xmlns:r="http://schemas.openxmlformats.org/officeDocument/2006/relationships" xmlns:p="http://schemas.openxmlformats.org/presentationml/2006/main">
+  <p:cSld>
+    <p:spTree>
+      <p:nvGrpSpPr>
+        <p:cNvPr id="1" name=""/>
+        <p:cNvGrpSpPr/>
+        <p:nvPr/>
+      </p:nvGrpSpPr>
+      <p:grpSpPr>
+        <a:xfrm>
+          <a:off x="0" y="0"/>
+          <a:ext cx="0" cy="0"/>
+          <a:chOff x="0" y="0"/>
+          <a:chExt cx="0" cy="0"/>
+        </a:xfrm>
+      </p:grpSpPr>
+      <p:sp>
+        <p:nvSpPr>
+          <p:cNvPr id="4" name="Rectangle 3">
+            <a:extLst>
+              <a:ext uri="{FF2B5EF4-FFF2-40B4-BE49-F238E27FC236}">
+                <a16:creationId xmlns:a16="http://schemas.microsoft.com/office/drawing/2014/main" id="{DA5E3CE4-274D-452C-A6CA-4337EE726B0F}"/>
+              </a:ext>
+            </a:extLst>
+          </p:cNvPr>
+          <p:cNvSpPr/>
+          <p:nvPr/>
+        </p:nvSpPr>
+        <p:spPr>
+          <a:xfrm>
+            <a:off x="672353" y="2223247"/>
+            <a:ext cx="1335741" cy="1344706"/>
+          </a:xfrm>
+          <a:prstGeom prst="rect">
+            <a:avLst/>
+          </a:prstGeom>
+        </p:spPr>
+        <p:style>
+          <a:lnRef idx="2">
+            <a:schemeClr val="accent1">
+              <a:shade val="50000"/>
+            </a:schemeClr>
+          </a:lnRef>
+          <a:fillRef idx="1">
+            <a:schemeClr val="accent1"/>
+          </a:fillRef>
+          <a:effectRef idx="0">
+            <a:schemeClr val="accent1"/>
+          </a:effectRef>
+          <a:fontRef idx="minor">
+            <a:schemeClr val="lt1"/>
+          </a:fontRef>
+        </p:style>
+        <p:txBody>
+          <a:bodyPr rtlCol="0" anchor="ctr"/>
+          <a:lstStyle/>
+          <a:p>
+            <a:pPr algn="ctr"/>
+            <a:endParaRPr lang="fr-FR"/>
+          </a:p>
+        </p:txBody>
+      </p:sp>
+      <p:sp>
+        <p:nvSpPr>
+          <p:cNvPr id="6" name="TextBox 5">
+            <a:extLst>
+              <a:ext uri="{FF2B5EF4-FFF2-40B4-BE49-F238E27FC236}">
+                <a16:creationId xmlns:a16="http://schemas.microsoft.com/office/drawing/2014/main" id="{4A689432-C8D2-4E66-A6B0-14C8FC978BAC}"/>
+              </a:ext>
+            </a:extLst>
+          </p:cNvPr>
+          <p:cNvSpPr txBox="1"/>
+          <p:nvPr/>
+        </p:nvSpPr>
+        <p:spPr>
+          <a:xfrm>
+            <a:off x="672353" y="1689847"/>
+            <a:ext cx="1269322" cy="369332"/>
+          </a:xfrm>
+          <a:prstGeom prst="rect">
+            <a:avLst/>
+          </a:prstGeom>
+          <a:noFill/>
+        </p:spPr>
+        <p:txBody>
+          <a:bodyPr wrap="none" rtlCol="0">
+            <a:spAutoFit/>
+          </a:bodyPr>
+          <a:lstStyle/>
+          <a:p>
+            <a:r>
+              <a:rPr lang="fr-FR" dirty="0"/>
+              <a:t>Client HTTP</a:t>
+            </a:r>
+          </a:p>
+        </p:txBody>
+      </p:sp>
+      <p:sp>
+        <p:nvSpPr>
+          <p:cNvPr id="7" name="Rectangle 6">
+            <a:extLst>
+              <a:ext uri="{FF2B5EF4-FFF2-40B4-BE49-F238E27FC236}">
+                <a16:creationId xmlns:a16="http://schemas.microsoft.com/office/drawing/2014/main" id="{A4AE6F98-D072-41DB-8C1C-E207A75F15AB}"/>
+              </a:ext>
+            </a:extLst>
+          </p:cNvPr>
+          <p:cNvSpPr/>
+          <p:nvPr/>
+        </p:nvSpPr>
+        <p:spPr>
+          <a:xfrm>
+            <a:off x="7126941" y="654424"/>
+            <a:ext cx="1667435" cy="1268505"/>
+          </a:xfrm>
+          <a:prstGeom prst="rect">
+            <a:avLst/>
+          </a:prstGeom>
+        </p:spPr>
+        <p:style>
+          <a:lnRef idx="2">
+            <a:schemeClr val="accent1">
+              <a:shade val="50000"/>
+            </a:schemeClr>
+          </a:lnRef>
+          <a:fillRef idx="1">
+            <a:schemeClr val="accent1"/>
+          </a:fillRef>
+          <a:effectRef idx="0">
+            <a:schemeClr val="accent1"/>
+          </a:effectRef>
+          <a:fontRef idx="minor">
+            <a:schemeClr val="lt1"/>
+          </a:fontRef>
+        </p:style>
+        <p:txBody>
+          <a:bodyPr rtlCol="0" anchor="ctr"/>
+          <a:lstStyle/>
+          <a:p>
+            <a:pPr algn="ctr"/>
+            <a:endParaRPr lang="fr-FR"/>
+          </a:p>
+        </p:txBody>
+      </p:sp>
+      <p:sp>
+        <p:nvSpPr>
+          <p:cNvPr id="8" name="TextBox 7">
+            <a:extLst>
+              <a:ext uri="{FF2B5EF4-FFF2-40B4-BE49-F238E27FC236}">
+                <a16:creationId xmlns:a16="http://schemas.microsoft.com/office/drawing/2014/main" id="{BB2304D1-E8DD-4B41-98BC-DF1CF830579D}"/>
+              </a:ext>
+            </a:extLst>
+          </p:cNvPr>
+          <p:cNvSpPr txBox="1"/>
+          <p:nvPr/>
+        </p:nvSpPr>
+        <p:spPr>
+          <a:xfrm>
+            <a:off x="7306235" y="282388"/>
+            <a:ext cx="2566921" cy="369332"/>
+          </a:xfrm>
+          <a:prstGeom prst="rect">
+            <a:avLst/>
+          </a:prstGeom>
+          <a:noFill/>
+        </p:spPr>
+        <p:txBody>
+          <a:bodyPr wrap="none" rtlCol="0">
+            <a:spAutoFit/>
+          </a:bodyPr>
+          <a:lstStyle/>
+          <a:p>
+            <a:r>
+              <a:rPr lang="fr-FR" dirty="0" err="1"/>
+              <a:t>Ng</a:t>
+            </a:r>
+            <a:r>
+              <a:rPr lang="fr-FR" dirty="0"/>
+              <a:t> serve (localhost:4202)</a:t>
+            </a:r>
+          </a:p>
+        </p:txBody>
+      </p:sp>
+      <p:sp>
+        <p:nvSpPr>
+          <p:cNvPr id="9" name="Rectangle 8">
+            <a:extLst>
+              <a:ext uri="{FF2B5EF4-FFF2-40B4-BE49-F238E27FC236}">
+                <a16:creationId xmlns:a16="http://schemas.microsoft.com/office/drawing/2014/main" id="{B4F5021A-4DA4-4EA7-83C6-FB51B171C837}"/>
+              </a:ext>
+            </a:extLst>
+          </p:cNvPr>
+          <p:cNvSpPr/>
+          <p:nvPr/>
+        </p:nvSpPr>
+        <p:spPr>
+          <a:xfrm>
+            <a:off x="7377953" y="4334436"/>
+            <a:ext cx="1667435" cy="1268505"/>
+          </a:xfrm>
+          <a:prstGeom prst="rect">
+            <a:avLst/>
+          </a:prstGeom>
+        </p:spPr>
+        <p:style>
+          <a:lnRef idx="2">
+            <a:schemeClr val="accent1">
+              <a:shade val="50000"/>
+            </a:schemeClr>
+          </a:lnRef>
+          <a:fillRef idx="1">
+            <a:schemeClr val="accent1"/>
+          </a:fillRef>
+          <a:effectRef idx="0">
+            <a:schemeClr val="accent1"/>
+          </a:effectRef>
+          <a:fontRef idx="minor">
+            <a:schemeClr val="lt1"/>
+          </a:fontRef>
+        </p:style>
+        <p:txBody>
+          <a:bodyPr rtlCol="0" anchor="ctr"/>
+          <a:lstStyle/>
+          <a:p>
+            <a:pPr algn="ctr"/>
+            <a:endParaRPr lang="fr-FR"/>
+          </a:p>
+        </p:txBody>
+      </p:sp>
+      <p:sp>
+        <p:nvSpPr>
+          <p:cNvPr id="10" name="TextBox 9">
+            <a:extLst>
+              <a:ext uri="{FF2B5EF4-FFF2-40B4-BE49-F238E27FC236}">
+                <a16:creationId xmlns:a16="http://schemas.microsoft.com/office/drawing/2014/main" id="{4A45E6C4-1B9F-4DAE-9BC7-45BCC1AE7ECD}"/>
+              </a:ext>
+            </a:extLst>
+          </p:cNvPr>
+          <p:cNvSpPr txBox="1"/>
+          <p:nvPr/>
+        </p:nvSpPr>
+        <p:spPr>
+          <a:xfrm>
+            <a:off x="7400365" y="3783106"/>
+            <a:ext cx="1602042" cy="369332"/>
+          </a:xfrm>
+          <a:prstGeom prst="rect">
+            <a:avLst/>
+          </a:prstGeom>
+          <a:noFill/>
+        </p:spPr>
+        <p:txBody>
+          <a:bodyPr wrap="none" rtlCol="0">
+            <a:spAutoFit/>
+          </a:bodyPr>
+          <a:lstStyle/>
+          <a:p>
+            <a:r>
+              <a:rPr lang="fr-FR" dirty="0"/>
+              <a:t>Localhost:3000</a:t>
+            </a:r>
+          </a:p>
+        </p:txBody>
+      </p:sp>
+      <p:sp>
+        <p:nvSpPr>
+          <p:cNvPr id="11" name="Cylinder 10">
+            <a:extLst>
+              <a:ext uri="{FF2B5EF4-FFF2-40B4-BE49-F238E27FC236}">
+                <a16:creationId xmlns:a16="http://schemas.microsoft.com/office/drawing/2014/main" id="{0D81C291-0EDB-4A3C-BBB0-57ED85299770}"/>
+              </a:ext>
+            </a:extLst>
+          </p:cNvPr>
+          <p:cNvSpPr/>
+          <p:nvPr/>
+        </p:nvSpPr>
+        <p:spPr>
+          <a:xfrm>
+            <a:off x="9542929" y="4787153"/>
+            <a:ext cx="2008095" cy="1743635"/>
+          </a:xfrm>
+          <a:prstGeom prst="can">
+            <a:avLst/>
+          </a:prstGeom>
+        </p:spPr>
+        <p:style>
+          <a:lnRef idx="2">
+            <a:schemeClr val="accent1">
+              <a:shade val="50000"/>
+            </a:schemeClr>
+          </a:lnRef>
+          <a:fillRef idx="1">
+            <a:schemeClr val="accent1"/>
+          </a:fillRef>
+          <a:effectRef idx="0">
+            <a:schemeClr val="accent1"/>
+          </a:effectRef>
+          <a:fontRef idx="minor">
+            <a:schemeClr val="lt1"/>
+          </a:fontRef>
+        </p:style>
+        <p:txBody>
+          <a:bodyPr rtlCol="0" anchor="ctr"/>
+          <a:lstStyle/>
+          <a:p>
+            <a:pPr algn="ctr"/>
+            <a:r>
+              <a:rPr lang="fr-FR" dirty="0"/>
+              <a:t>Articles</a:t>
+            </a:r>
+          </a:p>
+        </p:txBody>
+      </p:sp>
+      <p:cxnSp>
+        <p:nvCxnSpPr>
+          <p:cNvPr id="13" name="Straight Arrow Connector 12">
+            <a:extLst>
+              <a:ext uri="{FF2B5EF4-FFF2-40B4-BE49-F238E27FC236}">
+                <a16:creationId xmlns:a16="http://schemas.microsoft.com/office/drawing/2014/main" id="{12224B18-AE57-4597-84D4-AD17067BB68C}"/>
+              </a:ext>
+            </a:extLst>
+          </p:cNvPr>
+          <p:cNvCxnSpPr>
+            <a:stCxn id="9" idx="3"/>
+            <a:endCxn id="11" idx="2"/>
+          </p:cNvCxnSpPr>
+          <p:nvPr/>
+        </p:nvCxnSpPr>
+        <p:spPr>
+          <a:xfrm>
+            <a:off x="9045388" y="4968689"/>
+            <a:ext cx="497541" cy="690282"/>
+          </a:xfrm>
+          <a:prstGeom prst="straightConnector1">
+            <a:avLst/>
+          </a:prstGeom>
+          <a:ln w="76200">
+            <a:solidFill>
+              <a:schemeClr val="accent1"/>
+            </a:solidFill>
+            <a:headEnd type="triangle"/>
+            <a:tailEnd type="triangle"/>
+          </a:ln>
+        </p:spPr>
+        <p:style>
+          <a:lnRef idx="1">
+            <a:schemeClr val="accent1"/>
+          </a:lnRef>
+          <a:fillRef idx="0">
+            <a:schemeClr val="accent1"/>
+          </a:fillRef>
+          <a:effectRef idx="0">
+            <a:schemeClr val="accent1"/>
+          </a:effectRef>
+          <a:fontRef idx="minor">
+            <a:schemeClr val="tx1"/>
+          </a:fontRef>
+        </p:style>
+      </p:cxnSp>
+      <p:cxnSp>
+        <p:nvCxnSpPr>
+          <p:cNvPr id="15" name="Straight Arrow Connector 14">
+            <a:extLst>
+              <a:ext uri="{FF2B5EF4-FFF2-40B4-BE49-F238E27FC236}">
+                <a16:creationId xmlns:a16="http://schemas.microsoft.com/office/drawing/2014/main" id="{CF881EC6-9B52-44B0-8CCC-18B3DFE6C920}"/>
+              </a:ext>
+            </a:extLst>
+          </p:cNvPr>
+          <p:cNvCxnSpPr/>
+          <p:nvPr/>
+        </p:nvCxnSpPr>
+        <p:spPr>
+          <a:xfrm flipV="1">
+            <a:off x="2039471" y="1071282"/>
+            <a:ext cx="5087470" cy="1429871"/>
+          </a:xfrm>
+          <a:prstGeom prst="straightConnector1">
+            <a:avLst/>
+          </a:prstGeom>
+          <a:ln w="76200">
+            <a:solidFill>
+              <a:schemeClr val="accent1"/>
+            </a:solidFill>
+            <a:headEnd type="none" w="med" len="med"/>
+            <a:tailEnd type="triangle"/>
+          </a:ln>
+        </p:spPr>
+        <p:style>
+          <a:lnRef idx="1">
+            <a:schemeClr val="accent1"/>
+          </a:lnRef>
+          <a:fillRef idx="0">
+            <a:schemeClr val="accent1"/>
+          </a:fillRef>
+          <a:effectRef idx="0">
+            <a:schemeClr val="accent1"/>
+          </a:effectRef>
+          <a:fontRef idx="minor">
+            <a:schemeClr val="tx1"/>
+          </a:fontRef>
+        </p:style>
+      </p:cxnSp>
+      <p:cxnSp>
+        <p:nvCxnSpPr>
+          <p:cNvPr id="17" name="Straight Arrow Connector 16">
+            <a:extLst>
+              <a:ext uri="{FF2B5EF4-FFF2-40B4-BE49-F238E27FC236}">
+                <a16:creationId xmlns:a16="http://schemas.microsoft.com/office/drawing/2014/main" id="{2CAE3889-062B-44C9-8163-51350B728056}"/>
+              </a:ext>
+            </a:extLst>
+          </p:cNvPr>
+          <p:cNvCxnSpPr/>
+          <p:nvPr/>
+        </p:nvCxnSpPr>
+        <p:spPr>
+          <a:xfrm flipH="1">
+            <a:off x="2008094" y="1559859"/>
+            <a:ext cx="5118847" cy="1488141"/>
+          </a:xfrm>
+          <a:prstGeom prst="straightConnector1">
+            <a:avLst/>
+          </a:prstGeom>
+          <a:ln w="76200">
+            <a:solidFill>
+              <a:schemeClr val="accent1"/>
+            </a:solidFill>
+            <a:headEnd type="none" w="med" len="med"/>
+            <a:tailEnd type="triangle"/>
+          </a:ln>
+        </p:spPr>
+        <p:style>
+          <a:lnRef idx="1">
+            <a:schemeClr val="accent1"/>
+          </a:lnRef>
+          <a:fillRef idx="0">
+            <a:schemeClr val="accent1"/>
+          </a:fillRef>
+          <a:effectRef idx="0">
+            <a:schemeClr val="accent1"/>
+          </a:effectRef>
+          <a:fontRef idx="minor">
+            <a:schemeClr val="tx1"/>
+          </a:fontRef>
+        </p:style>
+      </p:cxnSp>
+      <p:cxnSp>
+        <p:nvCxnSpPr>
+          <p:cNvPr id="19" name="Straight Arrow Connector 18">
+            <a:extLst>
+              <a:ext uri="{FF2B5EF4-FFF2-40B4-BE49-F238E27FC236}">
+                <a16:creationId xmlns:a16="http://schemas.microsoft.com/office/drawing/2014/main" id="{B731A075-8F52-4D9B-B5DB-BADCD13421DB}"/>
+              </a:ext>
+            </a:extLst>
+          </p:cNvPr>
+          <p:cNvCxnSpPr>
+            <a:cxnSpLocks/>
+          </p:cNvCxnSpPr>
+          <p:nvPr/>
+        </p:nvCxnSpPr>
+        <p:spPr>
+          <a:xfrm flipV="1">
+            <a:off x="2039471" y="1846729"/>
+            <a:ext cx="5154705" cy="1411942"/>
+          </a:xfrm>
+          <a:prstGeom prst="straightConnector1">
+            <a:avLst/>
+          </a:prstGeom>
+          <a:ln w="76200">
+            <a:solidFill>
+              <a:schemeClr val="accent1"/>
+            </a:solidFill>
+            <a:headEnd type="none" w="med" len="med"/>
+            <a:tailEnd type="triangle"/>
+          </a:ln>
+        </p:spPr>
+        <p:style>
+          <a:lnRef idx="1">
+            <a:schemeClr val="accent1"/>
+          </a:lnRef>
+          <a:fillRef idx="0">
+            <a:schemeClr val="accent1"/>
+          </a:fillRef>
+          <a:effectRef idx="0">
+            <a:schemeClr val="accent1"/>
+          </a:effectRef>
+          <a:fontRef idx="minor">
+            <a:schemeClr val="tx1"/>
+          </a:fontRef>
+        </p:style>
+      </p:cxnSp>
+      <p:cxnSp>
+        <p:nvCxnSpPr>
+          <p:cNvPr id="21" name="Straight Arrow Connector 20">
+            <a:extLst>
+              <a:ext uri="{FF2B5EF4-FFF2-40B4-BE49-F238E27FC236}">
+                <a16:creationId xmlns:a16="http://schemas.microsoft.com/office/drawing/2014/main" id="{7EF35143-0202-40C8-A458-47D7FC026DC5}"/>
+              </a:ext>
+            </a:extLst>
+          </p:cNvPr>
+          <p:cNvCxnSpPr>
+            <a:cxnSpLocks/>
+          </p:cNvCxnSpPr>
+          <p:nvPr/>
+        </p:nvCxnSpPr>
+        <p:spPr>
+          <a:xfrm flipH="1">
+            <a:off x="1831042" y="1966401"/>
+            <a:ext cx="5667934" cy="1462599"/>
+          </a:xfrm>
+          <a:prstGeom prst="straightConnector1">
+            <a:avLst/>
+          </a:prstGeom>
+          <a:ln w="76200">
+            <a:solidFill>
+              <a:schemeClr val="accent1"/>
+            </a:solidFill>
+            <a:headEnd type="none" w="med" len="med"/>
+            <a:tailEnd type="triangle"/>
+          </a:ln>
+        </p:spPr>
+        <p:style>
+          <a:lnRef idx="1">
+            <a:schemeClr val="accent1"/>
+          </a:lnRef>
+          <a:fillRef idx="0">
+            <a:schemeClr val="accent1"/>
+          </a:fillRef>
+          <a:effectRef idx="0">
+            <a:schemeClr val="accent1"/>
+          </a:effectRef>
+          <a:fontRef idx="minor">
+            <a:schemeClr val="tx1"/>
+          </a:fontRef>
+        </p:style>
+      </p:cxnSp>
+      <p:cxnSp>
+        <p:nvCxnSpPr>
+          <p:cNvPr id="14" name="Straight Arrow Connector 13">
+            <a:extLst>
+              <a:ext uri="{FF2B5EF4-FFF2-40B4-BE49-F238E27FC236}">
+                <a16:creationId xmlns:a16="http://schemas.microsoft.com/office/drawing/2014/main" id="{2C752521-D310-4A77-9361-DFA222C9F939}"/>
+              </a:ext>
+            </a:extLst>
+          </p:cNvPr>
+          <p:cNvCxnSpPr/>
+          <p:nvPr/>
+        </p:nvCxnSpPr>
+        <p:spPr>
+          <a:xfrm>
+            <a:off x="7794812" y="1922929"/>
+            <a:ext cx="0" cy="2355477"/>
+          </a:xfrm>
+          <a:prstGeom prst="straightConnector1">
+            <a:avLst/>
+          </a:prstGeom>
+          <a:ln w="76200">
+            <a:solidFill>
+              <a:schemeClr val="accent1"/>
+            </a:solidFill>
+            <a:headEnd type="none" w="med" len="med"/>
+            <a:tailEnd type="triangle"/>
+          </a:ln>
+        </p:spPr>
+        <p:style>
+          <a:lnRef idx="1">
+            <a:schemeClr val="accent1"/>
+          </a:lnRef>
+          <a:fillRef idx="0">
+            <a:schemeClr val="accent1"/>
+          </a:fillRef>
+          <a:effectRef idx="0">
+            <a:schemeClr val="accent1"/>
+          </a:effectRef>
+          <a:fontRef idx="minor">
+            <a:schemeClr val="tx1"/>
+          </a:fontRef>
+        </p:style>
+      </p:cxnSp>
+      <p:cxnSp>
+        <p:nvCxnSpPr>
+          <p:cNvPr id="18" name="Straight Arrow Connector 17">
+            <a:extLst>
+              <a:ext uri="{FF2B5EF4-FFF2-40B4-BE49-F238E27FC236}">
+                <a16:creationId xmlns:a16="http://schemas.microsoft.com/office/drawing/2014/main" id="{EABB53CE-A7DE-4ED5-BABB-3C5686B96CF9}"/>
+              </a:ext>
+            </a:extLst>
+          </p:cNvPr>
+          <p:cNvCxnSpPr>
+            <a:stCxn id="9" idx="0"/>
+          </p:cNvCxnSpPr>
+          <p:nvPr/>
+        </p:nvCxnSpPr>
+        <p:spPr>
+          <a:xfrm flipH="1" flipV="1">
+            <a:off x="8153400" y="1922929"/>
+            <a:ext cx="58271" cy="2411507"/>
+          </a:xfrm>
+          <a:prstGeom prst="straightConnector1">
+            <a:avLst/>
+          </a:prstGeom>
+          <a:ln w="76200">
+            <a:solidFill>
+              <a:schemeClr val="accent1"/>
+            </a:solidFill>
+            <a:headEnd type="none" w="med" len="med"/>
+            <a:tailEnd type="triangle"/>
+          </a:ln>
+        </p:spPr>
+        <p:style>
+          <a:lnRef idx="1">
+            <a:schemeClr val="accent1"/>
+          </a:lnRef>
+          <a:fillRef idx="0">
+            <a:schemeClr val="accent1"/>
+          </a:fillRef>
+          <a:effectRef idx="0">
+            <a:schemeClr val="accent1"/>
+          </a:effectRef>
+          <a:fontRef idx="minor">
+            <a:schemeClr val="tx1"/>
+          </a:fontRef>
+        </p:style>
+      </p:cxnSp>
+      <p:sp>
+        <p:nvSpPr>
+          <p:cNvPr id="20" name="TextBox 19">
+            <a:extLst>
+              <a:ext uri="{FF2B5EF4-FFF2-40B4-BE49-F238E27FC236}">
+                <a16:creationId xmlns:a16="http://schemas.microsoft.com/office/drawing/2014/main" id="{8F168807-ABFF-4FC6-9048-9636BBEA751B}"/>
+              </a:ext>
+            </a:extLst>
+          </p:cNvPr>
+          <p:cNvSpPr txBox="1"/>
+          <p:nvPr/>
+        </p:nvSpPr>
+        <p:spPr>
+          <a:xfrm>
+            <a:off x="1941675" y="587188"/>
+            <a:ext cx="1965603" cy="369332"/>
+          </a:xfrm>
+          <a:prstGeom prst="rect">
+            <a:avLst/>
+          </a:prstGeom>
+          <a:noFill/>
+        </p:spPr>
+        <p:txBody>
+          <a:bodyPr wrap="none" rtlCol="0">
+            <a:spAutoFit/>
+          </a:bodyPr>
+          <a:lstStyle/>
+          <a:p>
+            <a:r>
+              <a:rPr lang="fr-FR" dirty="0"/>
+              <a:t>Scenario </a:t>
+            </a:r>
+            <a:r>
+              <a:rPr lang="fr-FR" dirty="0" err="1"/>
+              <a:t>Proxyconf</a:t>
+            </a:r>
+            <a:endParaRPr lang="fr-FR" dirty="0"/>
+          </a:p>
+        </p:txBody>
+      </p:sp>
+    </p:spTree>
+    <p:extLst>
+      <p:ext uri="{BB962C8B-B14F-4D97-AF65-F5344CB8AC3E}">
+        <p14:creationId xmlns:p14="http://schemas.microsoft.com/office/powerpoint/2010/main" val="2278531128"/>
+      </p:ext>
+    </p:extLst>
+  </p:cSld>
+  <p:clrMapOvr>
+    <a:masterClrMapping/>
+  </p:clrMapOvr>
+</p:sld>
+</file>
+
+<file path=ppt/slides/slide27.xml><?xml version="1.0" encoding="utf-8"?>
+<p:sld xmlns:a="http://schemas.openxmlformats.org/drawingml/2006/main" xmlns:r="http://schemas.openxmlformats.org/officeDocument/2006/relationships" xmlns:p="http://schemas.openxmlformats.org/presentationml/2006/main">
+  <p:cSld>
+    <p:spTree>
+      <p:nvGrpSpPr>
+        <p:cNvPr id="1" name=""/>
+        <p:cNvGrpSpPr/>
+        <p:nvPr/>
+      </p:nvGrpSpPr>
+      <p:grpSpPr>
+        <a:xfrm>
+          <a:off x="0" y="0"/>
+          <a:ext cx="0" cy="0"/>
+          <a:chOff x="0" y="0"/>
+          <a:chExt cx="0" cy="0"/>
+        </a:xfrm>
+      </p:grpSpPr>
+      <p:sp>
+        <p:nvSpPr>
+          <p:cNvPr id="2" name="Title 1">
+            <a:extLst>
+              <a:ext uri="{FF2B5EF4-FFF2-40B4-BE49-F238E27FC236}">
+                <a16:creationId xmlns:a16="http://schemas.microsoft.com/office/drawing/2014/main" id="{3C5BD584-E6BA-40CB-B853-A4A4B9653190}"/>
+              </a:ext>
+            </a:extLst>
+          </p:cNvPr>
+          <p:cNvSpPr>
+            <a:spLocks noGrp="1"/>
+          </p:cNvSpPr>
+          <p:nvPr>
+            <p:ph type="title"/>
+          </p:nvPr>
+        </p:nvSpPr>
+        <p:spPr/>
+        <p:txBody>
+          <a:bodyPr/>
+          <a:lstStyle/>
+          <a:p>
+            <a:r>
+              <a:rPr lang="fr-FR" dirty="0" err="1"/>
+              <a:t>Creation</a:t>
+            </a:r>
+            <a:r>
+              <a:rPr lang="fr-FR" dirty="0"/>
+              <a:t> d’un service enveloppant </a:t>
+            </a:r>
+            <a:r>
+              <a:rPr lang="fr-FR" dirty="0" err="1"/>
+              <a:t>HTTPClient</a:t>
+            </a:r>
+            <a:endParaRPr lang="fr-FR" dirty="0"/>
+          </a:p>
+        </p:txBody>
+      </p:sp>
+      <p:pic>
+        <p:nvPicPr>
+          <p:cNvPr id="4" name="Picture 3">
+            <a:extLst>
+              <a:ext uri="{FF2B5EF4-FFF2-40B4-BE49-F238E27FC236}">
+                <a16:creationId xmlns:a16="http://schemas.microsoft.com/office/drawing/2014/main" id="{F27A3FD2-0E80-4662-9F1A-0DB220A19DEB}"/>
+              </a:ext>
+            </a:extLst>
+          </p:cNvPr>
+          <p:cNvPicPr>
+            <a:picLocks noChangeAspect="1"/>
+          </p:cNvPicPr>
+          <p:nvPr/>
+        </p:nvPicPr>
+        <p:blipFill>
+          <a:blip r:embed="rId2"/>
+          <a:stretch>
+            <a:fillRect/>
+          </a:stretch>
+        </p:blipFill>
+        <p:spPr>
+          <a:xfrm>
+            <a:off x="948266" y="1458856"/>
+            <a:ext cx="7760305" cy="1970144"/>
+          </a:xfrm>
+          <a:prstGeom prst="rect">
+            <a:avLst/>
+          </a:prstGeom>
+        </p:spPr>
+      </p:pic>
+      <p:pic>
+        <p:nvPicPr>
+          <p:cNvPr id="5" name="Picture 4">
+            <a:extLst>
+              <a:ext uri="{FF2B5EF4-FFF2-40B4-BE49-F238E27FC236}">
+                <a16:creationId xmlns:a16="http://schemas.microsoft.com/office/drawing/2014/main" id="{0EFB7723-2DB2-4F6B-8CFE-E9773B7AF6FF}"/>
+              </a:ext>
+            </a:extLst>
+          </p:cNvPr>
+          <p:cNvPicPr>
+            <a:picLocks noChangeAspect="1"/>
+          </p:cNvPicPr>
+          <p:nvPr/>
+        </p:nvPicPr>
+        <p:blipFill>
+          <a:blip r:embed="rId3"/>
+          <a:stretch>
+            <a:fillRect/>
+          </a:stretch>
+        </p:blipFill>
+        <p:spPr>
+          <a:xfrm>
+            <a:off x="5263848" y="3192247"/>
+            <a:ext cx="6589486" cy="3548959"/>
+          </a:xfrm>
+          <a:prstGeom prst="rect">
+            <a:avLst/>
+          </a:prstGeom>
+        </p:spPr>
+      </p:pic>
+      <p:cxnSp>
+        <p:nvCxnSpPr>
+          <p:cNvPr id="7" name="Straight Arrow Connector 6">
+            <a:extLst>
+              <a:ext uri="{FF2B5EF4-FFF2-40B4-BE49-F238E27FC236}">
+                <a16:creationId xmlns:a16="http://schemas.microsoft.com/office/drawing/2014/main" id="{2D46E3E6-ED62-449F-AD63-EB1313DA5C86}"/>
+              </a:ext>
+            </a:extLst>
+          </p:cNvPr>
+          <p:cNvCxnSpPr/>
+          <p:nvPr/>
+        </p:nvCxnSpPr>
+        <p:spPr>
+          <a:xfrm>
+            <a:off x="3991429" y="4397829"/>
+            <a:ext cx="5534781" cy="568897"/>
+          </a:xfrm>
+          <a:prstGeom prst="straightConnector1">
+            <a:avLst/>
+          </a:prstGeom>
+          <a:ln w="76200">
+            <a:solidFill>
+              <a:schemeClr val="accent1"/>
+            </a:solidFill>
+            <a:headEnd type="none" w="med" len="med"/>
+            <a:tailEnd type="triangle"/>
+          </a:ln>
+        </p:spPr>
+        <p:style>
+          <a:lnRef idx="1">
+            <a:schemeClr val="accent1"/>
+          </a:lnRef>
+          <a:fillRef idx="0">
+            <a:schemeClr val="accent1"/>
+          </a:fillRef>
+          <a:effectRef idx="0">
+            <a:schemeClr val="accent1"/>
+          </a:effectRef>
+          <a:fontRef idx="minor">
+            <a:schemeClr val="tx1"/>
+          </a:fontRef>
+        </p:style>
+      </p:cxnSp>
+      <p:cxnSp>
+        <p:nvCxnSpPr>
+          <p:cNvPr id="9" name="Straight Arrow Connector 8">
+            <a:extLst>
+              <a:ext uri="{FF2B5EF4-FFF2-40B4-BE49-F238E27FC236}">
+                <a16:creationId xmlns:a16="http://schemas.microsoft.com/office/drawing/2014/main" id="{7CE7DB60-EB0D-4EE9-B6A2-02AEE2839CB8}"/>
+              </a:ext>
+            </a:extLst>
+          </p:cNvPr>
+          <p:cNvCxnSpPr/>
+          <p:nvPr/>
+        </p:nvCxnSpPr>
+        <p:spPr>
+          <a:xfrm>
+            <a:off x="4052047" y="4751294"/>
+            <a:ext cx="2321859" cy="847165"/>
+          </a:xfrm>
+          <a:prstGeom prst="straightConnector1">
+            <a:avLst/>
+          </a:prstGeom>
+          <a:ln w="76200">
+            <a:solidFill>
+              <a:schemeClr val="accent1"/>
+            </a:solidFill>
+            <a:headEnd type="none" w="med" len="med"/>
+            <a:tailEnd type="triangle"/>
+          </a:ln>
+        </p:spPr>
+        <p:style>
+          <a:lnRef idx="1">
+            <a:schemeClr val="accent1"/>
+          </a:lnRef>
+          <a:fillRef idx="0">
+            <a:schemeClr val="accent1"/>
+          </a:fillRef>
+          <a:effectRef idx="0">
+            <a:schemeClr val="accent1"/>
+          </a:effectRef>
+          <a:fontRef idx="minor">
+            <a:schemeClr val="tx1"/>
+          </a:fontRef>
+        </p:style>
+      </p:cxnSp>
+      <p:sp>
+        <p:nvSpPr>
+          <p:cNvPr id="10" name="TextBox 9">
+            <a:extLst>
+              <a:ext uri="{FF2B5EF4-FFF2-40B4-BE49-F238E27FC236}">
+                <a16:creationId xmlns:a16="http://schemas.microsoft.com/office/drawing/2014/main" id="{B5D56C8E-E9CF-482E-BAD0-7A99356F0F58}"/>
+              </a:ext>
+            </a:extLst>
+          </p:cNvPr>
+          <p:cNvSpPr txBox="1"/>
+          <p:nvPr/>
+        </p:nvSpPr>
+        <p:spPr>
+          <a:xfrm>
+            <a:off x="2613743" y="4271041"/>
+            <a:ext cx="984629" cy="369332"/>
+          </a:xfrm>
+          <a:prstGeom prst="rect">
+            <a:avLst/>
+          </a:prstGeom>
+          <a:noFill/>
+        </p:spPr>
+        <p:txBody>
+          <a:bodyPr wrap="none" rtlCol="0">
+            <a:spAutoFit/>
+          </a:bodyPr>
+          <a:lstStyle/>
+          <a:p>
+            <a:r>
+              <a:rPr lang="fr-FR" dirty="0" err="1"/>
+              <a:t>Heritage</a:t>
+            </a:r>
+            <a:endParaRPr lang="fr-FR" dirty="0"/>
+          </a:p>
+        </p:txBody>
+      </p:sp>
+    </p:spTree>
+    <p:extLst>
+      <p:ext uri="{BB962C8B-B14F-4D97-AF65-F5344CB8AC3E}">
+        <p14:creationId xmlns:p14="http://schemas.microsoft.com/office/powerpoint/2010/main" val="695518602"/>
+      </p:ext>
+    </p:extLst>
+  </p:cSld>
+  <p:clrMapOvr>
+    <a:masterClrMapping/>
+  </p:clrMapOvr>
+</p:sld>
+</file>
+
+<file path=ppt/slides/slide28.xml><?xml version="1.0" encoding="utf-8"?>
+<p:sld xmlns:a="http://schemas.openxmlformats.org/drawingml/2006/main" xmlns:r="http://schemas.openxmlformats.org/officeDocument/2006/relationships" xmlns:p="http://schemas.openxmlformats.org/presentationml/2006/main">
+  <p:cSld>
+    <p:spTree>
+      <p:nvGrpSpPr>
+        <p:cNvPr id="1" name=""/>
+        <p:cNvGrpSpPr/>
+        <p:nvPr/>
+      </p:nvGrpSpPr>
+      <p:grpSpPr>
+        <a:xfrm>
+          <a:off x="0" y="0"/>
+          <a:ext cx="0" cy="0"/>
+          <a:chOff x="0" y="0"/>
+          <a:chExt cx="0" cy="0"/>
+        </a:xfrm>
+      </p:grpSpPr>
+      <p:sp>
+        <p:nvSpPr>
+          <p:cNvPr id="2" name="Title 1">
+            <a:extLst>
+              <a:ext uri="{FF2B5EF4-FFF2-40B4-BE49-F238E27FC236}">
+                <a16:creationId xmlns:a16="http://schemas.microsoft.com/office/drawing/2014/main" id="{5E296C44-79AF-4558-8370-F2C8EC51DD5D}"/>
+              </a:ext>
+            </a:extLst>
+          </p:cNvPr>
+          <p:cNvSpPr>
+            <a:spLocks noGrp="1"/>
+          </p:cNvSpPr>
+          <p:nvPr>
+            <p:ph type="title"/>
+          </p:nvPr>
+        </p:nvSpPr>
+        <p:spPr/>
+        <p:txBody>
+          <a:bodyPr/>
+          <a:lstStyle/>
+          <a:p>
+            <a:r>
+              <a:rPr lang="fr-FR" dirty="0"/>
+              <a:t>Observables</a:t>
+            </a:r>
+          </a:p>
+        </p:txBody>
+      </p:sp>
+      <p:cxnSp>
+        <p:nvCxnSpPr>
+          <p:cNvPr id="5" name="Straight Arrow Connector 4">
+            <a:extLst>
+              <a:ext uri="{FF2B5EF4-FFF2-40B4-BE49-F238E27FC236}">
+                <a16:creationId xmlns:a16="http://schemas.microsoft.com/office/drawing/2014/main" id="{83EE6DC4-60ED-477F-959B-680F3D4E60AA}"/>
+              </a:ext>
+            </a:extLst>
+          </p:cNvPr>
+          <p:cNvCxnSpPr/>
+          <p:nvPr/>
+        </p:nvCxnSpPr>
+        <p:spPr>
+          <a:xfrm flipV="1">
+            <a:off x="448235" y="3092824"/>
+            <a:ext cx="11255189" cy="62752"/>
+          </a:xfrm>
+          <a:prstGeom prst="straightConnector1">
+            <a:avLst/>
+          </a:prstGeom>
+          <a:ln w="76200">
+            <a:solidFill>
+              <a:schemeClr val="accent1"/>
+            </a:solidFill>
+            <a:headEnd type="none" w="med" len="med"/>
+            <a:tailEnd type="triangle"/>
+          </a:ln>
+        </p:spPr>
+        <p:style>
+          <a:lnRef idx="1">
+            <a:schemeClr val="accent1"/>
+          </a:lnRef>
+          <a:fillRef idx="0">
+            <a:schemeClr val="accent1"/>
+          </a:fillRef>
+          <a:effectRef idx="0">
+            <a:schemeClr val="accent1"/>
+          </a:effectRef>
+          <a:fontRef idx="minor">
+            <a:schemeClr val="tx1"/>
+          </a:fontRef>
+        </p:style>
+      </p:cxnSp>
+      <p:cxnSp>
+        <p:nvCxnSpPr>
+          <p:cNvPr id="7" name="Straight Connector 6">
+            <a:extLst>
+              <a:ext uri="{FF2B5EF4-FFF2-40B4-BE49-F238E27FC236}">
+                <a16:creationId xmlns:a16="http://schemas.microsoft.com/office/drawing/2014/main" id="{514E9B2C-CB13-4116-882A-C642C23048C6}"/>
+              </a:ext>
+            </a:extLst>
+          </p:cNvPr>
+          <p:cNvCxnSpPr/>
+          <p:nvPr/>
+        </p:nvCxnSpPr>
+        <p:spPr>
+          <a:xfrm>
+            <a:off x="762000" y="2756647"/>
+            <a:ext cx="0" cy="847165"/>
+          </a:xfrm>
+          <a:prstGeom prst="line">
+            <a:avLst/>
+          </a:prstGeom>
+          <a:ln w="76200">
+            <a:solidFill>
+              <a:schemeClr val="accent1"/>
+            </a:solidFill>
+            <a:headEnd type="none" w="med" len="med"/>
+            <a:tailEnd type="none" w="med" len="med"/>
+          </a:ln>
+        </p:spPr>
+        <p:style>
+          <a:lnRef idx="1">
+            <a:schemeClr val="accent1"/>
+          </a:lnRef>
+          <a:fillRef idx="0">
+            <a:schemeClr val="accent1"/>
+          </a:fillRef>
+          <a:effectRef idx="0">
+            <a:schemeClr val="accent1"/>
+          </a:effectRef>
+          <a:fontRef idx="minor">
+            <a:schemeClr val="tx1"/>
+          </a:fontRef>
+        </p:style>
+      </p:cxnSp>
+      <p:sp>
+        <p:nvSpPr>
+          <p:cNvPr id="8" name="Oval 7">
+            <a:extLst>
+              <a:ext uri="{FF2B5EF4-FFF2-40B4-BE49-F238E27FC236}">
+                <a16:creationId xmlns:a16="http://schemas.microsoft.com/office/drawing/2014/main" id="{17076A36-3E36-43D8-BF4C-2886E4147A0C}"/>
+              </a:ext>
+            </a:extLst>
+          </p:cNvPr>
+          <p:cNvSpPr/>
+          <p:nvPr/>
+        </p:nvSpPr>
+        <p:spPr>
+          <a:xfrm>
+            <a:off x="1940858" y="2850776"/>
+            <a:ext cx="703725" cy="609600"/>
+          </a:xfrm>
+          <a:prstGeom prst="ellipse">
+            <a:avLst/>
+          </a:prstGeom>
+        </p:spPr>
+        <p:style>
+          <a:lnRef idx="2">
+            <a:schemeClr val="accent1">
+              <a:shade val="50000"/>
+            </a:schemeClr>
+          </a:lnRef>
+          <a:fillRef idx="1">
+            <a:schemeClr val="accent1"/>
+          </a:fillRef>
+          <a:effectRef idx="0">
+            <a:schemeClr val="accent1"/>
+          </a:effectRef>
+          <a:fontRef idx="minor">
+            <a:schemeClr val="lt1"/>
+          </a:fontRef>
+        </p:style>
+        <p:txBody>
+          <a:bodyPr rtlCol="0" anchor="ctr"/>
+          <a:lstStyle/>
+          <a:p>
+            <a:pPr algn="ctr"/>
+            <a:r>
+              <a:rPr lang="fr-FR" dirty="0"/>
+              <a:t>23</a:t>
+            </a:r>
+          </a:p>
+        </p:txBody>
+      </p:sp>
+      <p:sp>
+        <p:nvSpPr>
+          <p:cNvPr id="9" name="Oval 8">
+            <a:extLst>
+              <a:ext uri="{FF2B5EF4-FFF2-40B4-BE49-F238E27FC236}">
+                <a16:creationId xmlns:a16="http://schemas.microsoft.com/office/drawing/2014/main" id="{D914EBD9-A324-484E-AF36-8F686DF41452}"/>
+              </a:ext>
+            </a:extLst>
+          </p:cNvPr>
+          <p:cNvSpPr/>
+          <p:nvPr/>
+        </p:nvSpPr>
+        <p:spPr>
+          <a:xfrm>
+            <a:off x="3236251" y="2850776"/>
+            <a:ext cx="703725" cy="609600"/>
+          </a:xfrm>
+          <a:prstGeom prst="ellipse">
+            <a:avLst/>
+          </a:prstGeom>
+        </p:spPr>
+        <p:style>
+          <a:lnRef idx="2">
+            <a:schemeClr val="accent1">
+              <a:shade val="50000"/>
+            </a:schemeClr>
+          </a:lnRef>
+          <a:fillRef idx="1">
+            <a:schemeClr val="accent1"/>
+          </a:fillRef>
+          <a:effectRef idx="0">
+            <a:schemeClr val="accent1"/>
+          </a:effectRef>
+          <a:fontRef idx="minor">
+            <a:schemeClr val="lt1"/>
+          </a:fontRef>
+        </p:style>
+        <p:txBody>
+          <a:bodyPr rtlCol="0" anchor="ctr"/>
+          <a:lstStyle/>
+          <a:p>
+            <a:pPr algn="ctr"/>
+            <a:r>
+              <a:rPr lang="fr-FR" dirty="0"/>
+              <a:t>12</a:t>
+            </a:r>
+          </a:p>
+        </p:txBody>
+      </p:sp>
+      <p:sp>
+        <p:nvSpPr>
+          <p:cNvPr id="10" name="Oval 9">
+            <a:extLst>
+              <a:ext uri="{FF2B5EF4-FFF2-40B4-BE49-F238E27FC236}">
+                <a16:creationId xmlns:a16="http://schemas.microsoft.com/office/drawing/2014/main" id="{72A8AD83-C881-4847-B957-6005539987CD}"/>
+              </a:ext>
+            </a:extLst>
+          </p:cNvPr>
+          <p:cNvSpPr/>
+          <p:nvPr/>
+        </p:nvSpPr>
+        <p:spPr>
+          <a:xfrm>
+            <a:off x="6795240" y="2850776"/>
+            <a:ext cx="703725" cy="609600"/>
+          </a:xfrm>
+          <a:prstGeom prst="ellipse">
+            <a:avLst/>
+          </a:prstGeom>
+        </p:spPr>
+        <p:style>
+          <a:lnRef idx="2">
+            <a:schemeClr val="accent1">
+              <a:shade val="50000"/>
+            </a:schemeClr>
+          </a:lnRef>
+          <a:fillRef idx="1">
+            <a:schemeClr val="accent1"/>
+          </a:fillRef>
+          <a:effectRef idx="0">
+            <a:schemeClr val="accent1"/>
+          </a:effectRef>
+          <a:fontRef idx="minor">
+            <a:schemeClr val="lt1"/>
+          </a:fontRef>
+        </p:style>
+        <p:txBody>
+          <a:bodyPr rtlCol="0" anchor="ctr"/>
+          <a:lstStyle/>
+          <a:p>
+            <a:pPr algn="ctr"/>
+            <a:r>
+              <a:rPr lang="fr-FR" dirty="0"/>
+              <a:t>45</a:t>
+            </a:r>
+          </a:p>
+        </p:txBody>
+      </p:sp>
+      <p:cxnSp>
+        <p:nvCxnSpPr>
+          <p:cNvPr id="12" name="Straight Connector 11">
+            <a:extLst>
+              <a:ext uri="{FF2B5EF4-FFF2-40B4-BE49-F238E27FC236}">
+                <a16:creationId xmlns:a16="http://schemas.microsoft.com/office/drawing/2014/main" id="{52C5D9D6-6D3D-40E0-BC2B-B3C28BEB8795}"/>
+              </a:ext>
+            </a:extLst>
+          </p:cNvPr>
+          <p:cNvCxnSpPr>
+            <a:cxnSpLocks/>
+          </p:cNvCxnSpPr>
+          <p:nvPr/>
+        </p:nvCxnSpPr>
+        <p:spPr>
+          <a:xfrm>
+            <a:off x="7983071" y="2716306"/>
+            <a:ext cx="0" cy="887506"/>
+          </a:xfrm>
+          <a:prstGeom prst="line">
+            <a:avLst/>
+          </a:prstGeom>
+          <a:ln w="76200">
+            <a:solidFill>
+              <a:schemeClr val="accent1"/>
+            </a:solidFill>
+            <a:headEnd type="none" w="med" len="med"/>
+            <a:tailEnd type="none" w="med" len="med"/>
+          </a:ln>
+        </p:spPr>
+        <p:style>
+          <a:lnRef idx="1">
+            <a:schemeClr val="accent1"/>
+          </a:lnRef>
+          <a:fillRef idx="0">
+            <a:schemeClr val="accent1"/>
+          </a:fillRef>
+          <a:effectRef idx="0">
+            <a:schemeClr val="accent1"/>
+          </a:effectRef>
+          <a:fontRef idx="minor">
+            <a:schemeClr val="tx1"/>
+          </a:fontRef>
+        </p:style>
+      </p:cxnSp>
+      <p:sp>
+        <p:nvSpPr>
+          <p:cNvPr id="20" name="TextBox 19">
+            <a:extLst>
+              <a:ext uri="{FF2B5EF4-FFF2-40B4-BE49-F238E27FC236}">
+                <a16:creationId xmlns:a16="http://schemas.microsoft.com/office/drawing/2014/main" id="{73F52355-5507-4FC5-9084-E202F8D6D6CD}"/>
+              </a:ext>
+            </a:extLst>
+          </p:cNvPr>
+          <p:cNvSpPr txBox="1"/>
+          <p:nvPr/>
+        </p:nvSpPr>
+        <p:spPr>
+          <a:xfrm>
+            <a:off x="7624482" y="3886200"/>
+            <a:ext cx="1065484" cy="369332"/>
+          </a:xfrm>
+          <a:prstGeom prst="rect">
+            <a:avLst/>
+          </a:prstGeom>
+          <a:noFill/>
+        </p:spPr>
+        <p:txBody>
+          <a:bodyPr wrap="none" rtlCol="0">
+            <a:spAutoFit/>
+          </a:bodyPr>
+          <a:lstStyle/>
+          <a:p>
+            <a:r>
+              <a:rPr lang="fr-FR" dirty="0" err="1"/>
+              <a:t>complete</a:t>
+            </a:r>
+            <a:endParaRPr lang="fr-FR" dirty="0"/>
+          </a:p>
+        </p:txBody>
+      </p:sp>
+      <p:sp>
+        <p:nvSpPr>
+          <p:cNvPr id="22" name="TextBox 21">
+            <a:extLst>
+              <a:ext uri="{FF2B5EF4-FFF2-40B4-BE49-F238E27FC236}">
+                <a16:creationId xmlns:a16="http://schemas.microsoft.com/office/drawing/2014/main" id="{FD288B39-40DD-450A-8785-5F45FC6E233C}"/>
+              </a:ext>
+            </a:extLst>
+          </p:cNvPr>
+          <p:cNvSpPr txBox="1"/>
+          <p:nvPr/>
+        </p:nvSpPr>
+        <p:spPr>
+          <a:xfrm>
+            <a:off x="1940858" y="3751729"/>
+            <a:ext cx="595484" cy="369332"/>
+          </a:xfrm>
+          <a:prstGeom prst="rect">
+            <a:avLst/>
+          </a:prstGeom>
+          <a:noFill/>
+        </p:spPr>
+        <p:txBody>
+          <a:bodyPr wrap="none" rtlCol="0">
+            <a:spAutoFit/>
+          </a:bodyPr>
+          <a:lstStyle/>
+          <a:p>
+            <a:r>
+              <a:rPr lang="fr-FR" dirty="0" err="1"/>
+              <a:t>next</a:t>
+            </a:r>
+            <a:endParaRPr lang="fr-FR" dirty="0"/>
+          </a:p>
+        </p:txBody>
+      </p:sp>
+      <p:sp>
+        <p:nvSpPr>
+          <p:cNvPr id="23" name="TextBox 22">
+            <a:extLst>
+              <a:ext uri="{FF2B5EF4-FFF2-40B4-BE49-F238E27FC236}">
+                <a16:creationId xmlns:a16="http://schemas.microsoft.com/office/drawing/2014/main" id="{8D4649FE-8E76-40FB-8047-268C8906A75C}"/>
+              </a:ext>
+            </a:extLst>
+          </p:cNvPr>
+          <p:cNvSpPr txBox="1"/>
+          <p:nvPr/>
+        </p:nvSpPr>
+        <p:spPr>
+          <a:xfrm>
+            <a:off x="3236251" y="3770549"/>
+            <a:ext cx="595484" cy="369332"/>
+          </a:xfrm>
+          <a:prstGeom prst="rect">
+            <a:avLst/>
+          </a:prstGeom>
+          <a:noFill/>
+        </p:spPr>
+        <p:txBody>
+          <a:bodyPr wrap="none" rtlCol="0">
+            <a:spAutoFit/>
+          </a:bodyPr>
+          <a:lstStyle/>
+          <a:p>
+            <a:r>
+              <a:rPr lang="fr-FR" dirty="0" err="1"/>
+              <a:t>next</a:t>
+            </a:r>
+            <a:endParaRPr lang="fr-FR" dirty="0"/>
+          </a:p>
+        </p:txBody>
+      </p:sp>
+      <p:sp>
+        <p:nvSpPr>
+          <p:cNvPr id="24" name="TextBox 23">
+            <a:extLst>
+              <a:ext uri="{FF2B5EF4-FFF2-40B4-BE49-F238E27FC236}">
+                <a16:creationId xmlns:a16="http://schemas.microsoft.com/office/drawing/2014/main" id="{E1176E81-352F-431F-B418-175EB1EA974C}"/>
+              </a:ext>
+            </a:extLst>
+          </p:cNvPr>
+          <p:cNvSpPr txBox="1"/>
+          <p:nvPr/>
+        </p:nvSpPr>
+        <p:spPr>
+          <a:xfrm>
+            <a:off x="6849360" y="3751729"/>
+            <a:ext cx="595484" cy="369332"/>
+          </a:xfrm>
+          <a:prstGeom prst="rect">
+            <a:avLst/>
+          </a:prstGeom>
+          <a:noFill/>
+        </p:spPr>
+        <p:txBody>
+          <a:bodyPr wrap="none" rtlCol="0">
+            <a:spAutoFit/>
+          </a:bodyPr>
+          <a:lstStyle/>
+          <a:p>
+            <a:r>
+              <a:rPr lang="fr-FR" dirty="0" err="1"/>
+              <a:t>next</a:t>
+            </a:r>
+            <a:endParaRPr lang="fr-FR" dirty="0"/>
+          </a:p>
+        </p:txBody>
+      </p:sp>
+      <p:cxnSp>
+        <p:nvCxnSpPr>
+          <p:cNvPr id="25" name="Straight Arrow Connector 24">
+            <a:extLst>
+              <a:ext uri="{FF2B5EF4-FFF2-40B4-BE49-F238E27FC236}">
+                <a16:creationId xmlns:a16="http://schemas.microsoft.com/office/drawing/2014/main" id="{D88E9AA7-A863-4EE0-A091-C86443759ED7}"/>
+              </a:ext>
+            </a:extLst>
+          </p:cNvPr>
+          <p:cNvCxnSpPr/>
+          <p:nvPr/>
+        </p:nvCxnSpPr>
+        <p:spPr>
+          <a:xfrm flipV="1">
+            <a:off x="457202" y="4997830"/>
+            <a:ext cx="11255189" cy="62752"/>
+          </a:xfrm>
+          <a:prstGeom prst="straightConnector1">
+            <a:avLst/>
+          </a:prstGeom>
+          <a:ln w="76200">
+            <a:solidFill>
+              <a:schemeClr val="accent1"/>
+            </a:solidFill>
+            <a:headEnd type="none" w="med" len="med"/>
+            <a:tailEnd type="triangle"/>
+          </a:ln>
+        </p:spPr>
+        <p:style>
+          <a:lnRef idx="1">
+            <a:schemeClr val="accent1"/>
+          </a:lnRef>
+          <a:fillRef idx="0">
+            <a:schemeClr val="accent1"/>
+          </a:fillRef>
+          <a:effectRef idx="0">
+            <a:schemeClr val="accent1"/>
+          </a:effectRef>
+          <a:fontRef idx="minor">
+            <a:schemeClr val="tx1"/>
+          </a:fontRef>
+        </p:style>
+      </p:cxnSp>
+      <p:cxnSp>
+        <p:nvCxnSpPr>
+          <p:cNvPr id="26" name="Straight Connector 25">
+            <a:extLst>
+              <a:ext uri="{FF2B5EF4-FFF2-40B4-BE49-F238E27FC236}">
+                <a16:creationId xmlns:a16="http://schemas.microsoft.com/office/drawing/2014/main" id="{15C74AC2-F0FE-4EA4-BCA5-AB7725668992}"/>
+              </a:ext>
+            </a:extLst>
+          </p:cNvPr>
+          <p:cNvCxnSpPr/>
+          <p:nvPr/>
+        </p:nvCxnSpPr>
+        <p:spPr>
+          <a:xfrm>
+            <a:off x="770967" y="4661653"/>
+            <a:ext cx="0" cy="847165"/>
+          </a:xfrm>
+          <a:prstGeom prst="line">
+            <a:avLst/>
+          </a:prstGeom>
+          <a:ln w="76200">
+            <a:solidFill>
+              <a:schemeClr val="accent1"/>
+            </a:solidFill>
+            <a:headEnd type="none" w="med" len="med"/>
+            <a:tailEnd type="none" w="med" len="med"/>
+          </a:ln>
+        </p:spPr>
+        <p:style>
+          <a:lnRef idx="1">
+            <a:schemeClr val="accent1"/>
+          </a:lnRef>
+          <a:fillRef idx="0">
+            <a:schemeClr val="accent1"/>
+          </a:fillRef>
+          <a:effectRef idx="0">
+            <a:schemeClr val="accent1"/>
+          </a:effectRef>
+          <a:fontRef idx="minor">
+            <a:schemeClr val="tx1"/>
+          </a:fontRef>
+        </p:style>
+      </p:cxnSp>
+      <p:sp>
+        <p:nvSpPr>
+          <p:cNvPr id="27" name="Oval 26">
+            <a:extLst>
+              <a:ext uri="{FF2B5EF4-FFF2-40B4-BE49-F238E27FC236}">
+                <a16:creationId xmlns:a16="http://schemas.microsoft.com/office/drawing/2014/main" id="{1A5AEADF-B74A-47F7-AC3A-A1829644AD42}"/>
+              </a:ext>
+            </a:extLst>
+          </p:cNvPr>
+          <p:cNvSpPr/>
+          <p:nvPr/>
+        </p:nvSpPr>
+        <p:spPr>
+          <a:xfrm>
+            <a:off x="1949825" y="4755782"/>
+            <a:ext cx="703725" cy="609600"/>
+          </a:xfrm>
+          <a:prstGeom prst="ellipse">
+            <a:avLst/>
+          </a:prstGeom>
+        </p:spPr>
+        <p:style>
+          <a:lnRef idx="2">
+            <a:schemeClr val="accent1">
+              <a:shade val="50000"/>
+            </a:schemeClr>
+          </a:lnRef>
+          <a:fillRef idx="1">
+            <a:schemeClr val="accent1"/>
+          </a:fillRef>
+          <a:effectRef idx="0">
+            <a:schemeClr val="accent1"/>
+          </a:effectRef>
+          <a:fontRef idx="minor">
+            <a:schemeClr val="lt1"/>
+          </a:fontRef>
+        </p:style>
+        <p:txBody>
+          <a:bodyPr rtlCol="0" anchor="ctr"/>
+          <a:lstStyle/>
+          <a:p>
+            <a:pPr algn="ctr"/>
+            <a:r>
+              <a:rPr lang="fr-FR" dirty="0"/>
+              <a:t>23</a:t>
+            </a:r>
+          </a:p>
+        </p:txBody>
+      </p:sp>
+      <p:sp>
+        <p:nvSpPr>
+          <p:cNvPr id="28" name="Oval 27">
+            <a:extLst>
+              <a:ext uri="{FF2B5EF4-FFF2-40B4-BE49-F238E27FC236}">
+                <a16:creationId xmlns:a16="http://schemas.microsoft.com/office/drawing/2014/main" id="{EA18A0D8-BD98-4175-A1D2-1CAB2EFBABEF}"/>
+              </a:ext>
+            </a:extLst>
+          </p:cNvPr>
+          <p:cNvSpPr/>
+          <p:nvPr/>
+        </p:nvSpPr>
+        <p:spPr>
+          <a:xfrm>
+            <a:off x="3245218" y="4755782"/>
+            <a:ext cx="703725" cy="609600"/>
+          </a:xfrm>
+          <a:prstGeom prst="ellipse">
+            <a:avLst/>
+          </a:prstGeom>
+        </p:spPr>
+        <p:style>
+          <a:lnRef idx="2">
+            <a:schemeClr val="accent1">
+              <a:shade val="50000"/>
+            </a:schemeClr>
+          </a:lnRef>
+          <a:fillRef idx="1">
+            <a:schemeClr val="accent1"/>
+          </a:fillRef>
+          <a:effectRef idx="0">
+            <a:schemeClr val="accent1"/>
+          </a:effectRef>
+          <a:fontRef idx="minor">
+            <a:schemeClr val="lt1"/>
+          </a:fontRef>
+        </p:style>
+        <p:txBody>
+          <a:bodyPr rtlCol="0" anchor="ctr"/>
+          <a:lstStyle/>
+          <a:p>
+            <a:pPr algn="ctr"/>
+            <a:r>
+              <a:rPr lang="fr-FR" dirty="0"/>
+              <a:t>12</a:t>
+            </a:r>
+          </a:p>
+        </p:txBody>
+      </p:sp>
+      <p:sp>
+        <p:nvSpPr>
+          <p:cNvPr id="29" name="Oval 28">
+            <a:extLst>
+              <a:ext uri="{FF2B5EF4-FFF2-40B4-BE49-F238E27FC236}">
+                <a16:creationId xmlns:a16="http://schemas.microsoft.com/office/drawing/2014/main" id="{5F80BD2B-CEEC-44DB-9293-ACD0361C13D3}"/>
+              </a:ext>
+            </a:extLst>
+          </p:cNvPr>
+          <p:cNvSpPr/>
+          <p:nvPr/>
+        </p:nvSpPr>
+        <p:spPr>
+          <a:xfrm>
+            <a:off x="6804207" y="4755782"/>
+            <a:ext cx="703725" cy="609600"/>
+          </a:xfrm>
+          <a:prstGeom prst="ellipse">
+            <a:avLst/>
+          </a:prstGeom>
+        </p:spPr>
+        <p:style>
+          <a:lnRef idx="2">
+            <a:schemeClr val="accent1">
+              <a:shade val="50000"/>
+            </a:schemeClr>
+          </a:lnRef>
+          <a:fillRef idx="1">
+            <a:schemeClr val="accent1"/>
+          </a:fillRef>
+          <a:effectRef idx="0">
+            <a:schemeClr val="accent1"/>
+          </a:effectRef>
+          <a:fontRef idx="minor">
+            <a:schemeClr val="lt1"/>
+          </a:fontRef>
+        </p:style>
+        <p:txBody>
+          <a:bodyPr rtlCol="0" anchor="ctr"/>
+          <a:lstStyle/>
+          <a:p>
+            <a:pPr algn="ctr"/>
+            <a:r>
+              <a:rPr lang="fr-FR" dirty="0"/>
+              <a:t>45</a:t>
+            </a:r>
+          </a:p>
+        </p:txBody>
+      </p:sp>
+      <p:cxnSp>
+        <p:nvCxnSpPr>
+          <p:cNvPr id="31" name="Straight Connector 30">
+            <a:extLst>
+              <a:ext uri="{FF2B5EF4-FFF2-40B4-BE49-F238E27FC236}">
+                <a16:creationId xmlns:a16="http://schemas.microsoft.com/office/drawing/2014/main" id="{56C284B2-0C6E-4DF8-BFB8-760306A5F301}"/>
+              </a:ext>
+            </a:extLst>
+          </p:cNvPr>
+          <p:cNvCxnSpPr/>
+          <p:nvPr/>
+        </p:nvCxnSpPr>
+        <p:spPr>
+          <a:xfrm>
+            <a:off x="8857132" y="4791641"/>
+            <a:ext cx="349623" cy="372036"/>
+          </a:xfrm>
+          <a:prstGeom prst="line">
+            <a:avLst/>
+          </a:prstGeom>
+          <a:ln w="76200">
+            <a:solidFill>
+              <a:schemeClr val="accent1"/>
+            </a:solidFill>
+            <a:headEnd type="none" w="med" len="med"/>
+            <a:tailEnd type="none" w="med" len="med"/>
+          </a:ln>
+        </p:spPr>
+        <p:style>
+          <a:lnRef idx="1">
+            <a:schemeClr val="accent1"/>
+          </a:lnRef>
+          <a:fillRef idx="0">
+            <a:schemeClr val="accent1"/>
+          </a:fillRef>
+          <a:effectRef idx="0">
+            <a:schemeClr val="accent1"/>
+          </a:effectRef>
+          <a:fontRef idx="minor">
+            <a:schemeClr val="tx1"/>
+          </a:fontRef>
+        </p:style>
+      </p:cxnSp>
+      <p:cxnSp>
+        <p:nvCxnSpPr>
+          <p:cNvPr id="32" name="Straight Connector 31">
+            <a:extLst>
+              <a:ext uri="{FF2B5EF4-FFF2-40B4-BE49-F238E27FC236}">
+                <a16:creationId xmlns:a16="http://schemas.microsoft.com/office/drawing/2014/main" id="{BF252537-2614-488F-A15C-C290441FDE49}"/>
+              </a:ext>
+            </a:extLst>
+          </p:cNvPr>
+          <p:cNvCxnSpPr/>
+          <p:nvPr/>
+        </p:nvCxnSpPr>
+        <p:spPr>
+          <a:xfrm flipH="1">
+            <a:off x="8857132" y="4755782"/>
+            <a:ext cx="336164" cy="488577"/>
+          </a:xfrm>
+          <a:prstGeom prst="line">
+            <a:avLst/>
+          </a:prstGeom>
+          <a:ln w="76200">
+            <a:solidFill>
+              <a:schemeClr val="accent1"/>
+            </a:solidFill>
+            <a:headEnd type="none" w="med" len="med"/>
+            <a:tailEnd type="none" w="med" len="med"/>
+          </a:ln>
+        </p:spPr>
+        <p:style>
+          <a:lnRef idx="1">
+            <a:schemeClr val="accent1"/>
+          </a:lnRef>
+          <a:fillRef idx="0">
+            <a:schemeClr val="accent1"/>
+          </a:fillRef>
+          <a:effectRef idx="0">
+            <a:schemeClr val="accent1"/>
+          </a:effectRef>
+          <a:fontRef idx="minor">
+            <a:schemeClr val="tx1"/>
+          </a:fontRef>
+        </p:style>
+      </p:cxnSp>
+      <p:sp>
+        <p:nvSpPr>
+          <p:cNvPr id="34" name="TextBox 33">
+            <a:extLst>
+              <a:ext uri="{FF2B5EF4-FFF2-40B4-BE49-F238E27FC236}">
+                <a16:creationId xmlns:a16="http://schemas.microsoft.com/office/drawing/2014/main" id="{BFF7AECC-4C65-4373-ABDF-2F66E33D99C3}"/>
+              </a:ext>
+            </a:extLst>
+          </p:cNvPr>
+          <p:cNvSpPr txBox="1"/>
+          <p:nvPr/>
+        </p:nvSpPr>
+        <p:spPr>
+          <a:xfrm>
+            <a:off x="8803343" y="5508818"/>
+            <a:ext cx="658642" cy="369332"/>
+          </a:xfrm>
+          <a:prstGeom prst="rect">
+            <a:avLst/>
+          </a:prstGeom>
+          <a:noFill/>
+        </p:spPr>
+        <p:txBody>
+          <a:bodyPr wrap="none" rtlCol="0">
+            <a:spAutoFit/>
+          </a:bodyPr>
+          <a:lstStyle/>
+          <a:p>
+            <a:r>
+              <a:rPr lang="fr-FR" dirty="0" err="1"/>
+              <a:t>error</a:t>
+            </a:r>
+            <a:endParaRPr lang="fr-FR" dirty="0"/>
+          </a:p>
+        </p:txBody>
+      </p:sp>
+      <p:sp>
+        <p:nvSpPr>
+          <p:cNvPr id="35" name="TextBox 34">
+            <a:extLst>
+              <a:ext uri="{FF2B5EF4-FFF2-40B4-BE49-F238E27FC236}">
+                <a16:creationId xmlns:a16="http://schemas.microsoft.com/office/drawing/2014/main" id="{989EE450-31D0-474E-ADBB-B379E403BD11}"/>
+              </a:ext>
+            </a:extLst>
+          </p:cNvPr>
+          <p:cNvSpPr txBox="1"/>
+          <p:nvPr/>
+        </p:nvSpPr>
+        <p:spPr>
+          <a:xfrm>
+            <a:off x="1949825" y="5656735"/>
+            <a:ext cx="595484" cy="369332"/>
+          </a:xfrm>
+          <a:prstGeom prst="rect">
+            <a:avLst/>
+          </a:prstGeom>
+          <a:noFill/>
+        </p:spPr>
+        <p:txBody>
+          <a:bodyPr wrap="none" rtlCol="0">
+            <a:spAutoFit/>
+          </a:bodyPr>
+          <a:lstStyle/>
+          <a:p>
+            <a:r>
+              <a:rPr lang="fr-FR" dirty="0" err="1"/>
+              <a:t>next</a:t>
+            </a:r>
+            <a:endParaRPr lang="fr-FR" dirty="0"/>
+          </a:p>
+        </p:txBody>
+      </p:sp>
+      <p:sp>
+        <p:nvSpPr>
+          <p:cNvPr id="36" name="TextBox 35">
+            <a:extLst>
+              <a:ext uri="{FF2B5EF4-FFF2-40B4-BE49-F238E27FC236}">
+                <a16:creationId xmlns:a16="http://schemas.microsoft.com/office/drawing/2014/main" id="{4BCDFB5B-B61A-4457-9C38-4F12669F9412}"/>
+              </a:ext>
+            </a:extLst>
+          </p:cNvPr>
+          <p:cNvSpPr txBox="1"/>
+          <p:nvPr/>
+        </p:nvSpPr>
+        <p:spPr>
+          <a:xfrm>
+            <a:off x="3245218" y="5675555"/>
+            <a:ext cx="595484" cy="369332"/>
+          </a:xfrm>
+          <a:prstGeom prst="rect">
+            <a:avLst/>
+          </a:prstGeom>
+          <a:noFill/>
+        </p:spPr>
+        <p:txBody>
+          <a:bodyPr wrap="none" rtlCol="0">
+            <a:spAutoFit/>
+          </a:bodyPr>
+          <a:lstStyle/>
+          <a:p>
+            <a:r>
+              <a:rPr lang="fr-FR" dirty="0" err="1"/>
+              <a:t>next</a:t>
+            </a:r>
+            <a:endParaRPr lang="fr-FR" dirty="0"/>
+          </a:p>
+        </p:txBody>
+      </p:sp>
+      <p:sp>
+        <p:nvSpPr>
+          <p:cNvPr id="37" name="TextBox 36">
+            <a:extLst>
+              <a:ext uri="{FF2B5EF4-FFF2-40B4-BE49-F238E27FC236}">
+                <a16:creationId xmlns:a16="http://schemas.microsoft.com/office/drawing/2014/main" id="{2B63CE20-883E-47AB-9629-738B95E4AA7A}"/>
+              </a:ext>
+            </a:extLst>
+          </p:cNvPr>
+          <p:cNvSpPr txBox="1"/>
+          <p:nvPr/>
+        </p:nvSpPr>
+        <p:spPr>
+          <a:xfrm>
+            <a:off x="6858327" y="5656735"/>
+            <a:ext cx="595484" cy="369332"/>
+          </a:xfrm>
+          <a:prstGeom prst="rect">
+            <a:avLst/>
+          </a:prstGeom>
+          <a:noFill/>
+        </p:spPr>
+        <p:txBody>
+          <a:bodyPr wrap="none" rtlCol="0">
+            <a:spAutoFit/>
+          </a:bodyPr>
+          <a:lstStyle/>
+          <a:p>
+            <a:r>
+              <a:rPr lang="fr-FR" dirty="0" err="1"/>
+              <a:t>next</a:t>
+            </a:r>
+            <a:endParaRPr lang="fr-FR" dirty="0"/>
+          </a:p>
+        </p:txBody>
+      </p:sp>
+    </p:spTree>
+    <p:extLst>
+      <p:ext uri="{BB962C8B-B14F-4D97-AF65-F5344CB8AC3E}">
+        <p14:creationId xmlns:p14="http://schemas.microsoft.com/office/powerpoint/2010/main" val="3895572910"/>
+      </p:ext>
+    </p:extLst>
+  </p:cSld>
+  <p:clrMapOvr>
+    <a:masterClrMapping/>
+  </p:clrMapOvr>
+</p:sld>
+</file>
+
+<file path=ppt/slides/slide29.xml><?xml version="1.0" encoding="utf-8"?>
+<p:sld xmlns:a="http://schemas.openxmlformats.org/drawingml/2006/main" xmlns:r="http://schemas.openxmlformats.org/officeDocument/2006/relationships" xmlns:p="http://schemas.openxmlformats.org/presentationml/2006/main">
+  <p:cSld>
+    <p:spTree>
+      <p:nvGrpSpPr>
+        <p:cNvPr id="1" name=""/>
+        <p:cNvGrpSpPr/>
+        <p:nvPr/>
+      </p:nvGrpSpPr>
+      <p:grpSpPr>
+        <a:xfrm>
+          <a:off x="0" y="0"/>
+          <a:ext cx="0" cy="0"/>
+          <a:chOff x="0" y="0"/>
+          <a:chExt cx="0" cy="0"/>
+        </a:xfrm>
+      </p:grpSpPr>
+      <p:sp>
+        <p:nvSpPr>
+          <p:cNvPr id="2" name="Title 1">
+            <a:extLst>
+              <a:ext uri="{FF2B5EF4-FFF2-40B4-BE49-F238E27FC236}">
+                <a16:creationId xmlns:a16="http://schemas.microsoft.com/office/drawing/2014/main" id="{F33FF31E-ACE9-4E64-8E70-83307358C4BA}"/>
+              </a:ext>
+            </a:extLst>
+          </p:cNvPr>
+          <p:cNvSpPr>
+            <a:spLocks noGrp="1"/>
+          </p:cNvSpPr>
+          <p:nvPr>
+            <p:ph type="title"/>
+          </p:nvPr>
+        </p:nvSpPr>
+        <p:spPr/>
+        <p:txBody>
+          <a:bodyPr/>
+          <a:lstStyle/>
+          <a:p>
+            <a:r>
+              <a:rPr lang="fr-FR" dirty="0" err="1"/>
+              <a:t>HttpClient</a:t>
+            </a:r>
+            <a:endParaRPr lang="fr-FR" dirty="0"/>
+          </a:p>
+        </p:txBody>
+      </p:sp>
+      <p:cxnSp>
+        <p:nvCxnSpPr>
+          <p:cNvPr id="5" name="Straight Arrow Connector 4">
+            <a:extLst>
+              <a:ext uri="{FF2B5EF4-FFF2-40B4-BE49-F238E27FC236}">
+                <a16:creationId xmlns:a16="http://schemas.microsoft.com/office/drawing/2014/main" id="{6EFAA6DA-08C2-43CF-9F23-B7A561B0FE9A}"/>
+              </a:ext>
+            </a:extLst>
+          </p:cNvPr>
+          <p:cNvCxnSpPr/>
+          <p:nvPr/>
+        </p:nvCxnSpPr>
+        <p:spPr>
+          <a:xfrm>
+            <a:off x="367553" y="3267635"/>
+            <a:ext cx="11053482" cy="0"/>
+          </a:xfrm>
+          <a:prstGeom prst="straightConnector1">
+            <a:avLst/>
+          </a:prstGeom>
+          <a:ln w="76200">
+            <a:solidFill>
+              <a:schemeClr val="accent1"/>
+            </a:solidFill>
+            <a:headEnd type="none" w="med" len="med"/>
+            <a:tailEnd type="triangle"/>
+          </a:ln>
+        </p:spPr>
+        <p:style>
+          <a:lnRef idx="1">
+            <a:schemeClr val="accent1"/>
+          </a:lnRef>
+          <a:fillRef idx="0">
+            <a:schemeClr val="accent1"/>
+          </a:fillRef>
+          <a:effectRef idx="0">
+            <a:schemeClr val="accent1"/>
+          </a:effectRef>
+          <a:fontRef idx="minor">
+            <a:schemeClr val="tx1"/>
+          </a:fontRef>
+        </p:style>
+      </p:cxnSp>
+      <p:cxnSp>
+        <p:nvCxnSpPr>
+          <p:cNvPr id="6" name="Straight Arrow Connector 5">
+            <a:extLst>
+              <a:ext uri="{FF2B5EF4-FFF2-40B4-BE49-F238E27FC236}">
+                <a16:creationId xmlns:a16="http://schemas.microsoft.com/office/drawing/2014/main" id="{1D29EF79-B115-4C20-85FB-F82AB83F96C5}"/>
+              </a:ext>
+            </a:extLst>
+          </p:cNvPr>
+          <p:cNvCxnSpPr/>
+          <p:nvPr/>
+        </p:nvCxnSpPr>
+        <p:spPr>
+          <a:xfrm>
+            <a:off x="367553" y="5302623"/>
+            <a:ext cx="11053482" cy="0"/>
+          </a:xfrm>
+          <a:prstGeom prst="straightConnector1">
+            <a:avLst/>
+          </a:prstGeom>
+          <a:ln w="76200">
+            <a:solidFill>
+              <a:schemeClr val="accent1"/>
+            </a:solidFill>
+            <a:headEnd type="none" w="med" len="med"/>
+            <a:tailEnd type="triangle"/>
+          </a:ln>
+        </p:spPr>
+        <p:style>
+          <a:lnRef idx="1">
+            <a:schemeClr val="accent1"/>
+          </a:lnRef>
+          <a:fillRef idx="0">
+            <a:schemeClr val="accent1"/>
+          </a:fillRef>
+          <a:effectRef idx="0">
+            <a:schemeClr val="accent1"/>
+          </a:effectRef>
+          <a:fontRef idx="minor">
+            <a:schemeClr val="tx1"/>
+          </a:fontRef>
+        </p:style>
+      </p:cxnSp>
+      <p:cxnSp>
+        <p:nvCxnSpPr>
+          <p:cNvPr id="8" name="Straight Connector 7">
+            <a:extLst>
+              <a:ext uri="{FF2B5EF4-FFF2-40B4-BE49-F238E27FC236}">
+                <a16:creationId xmlns:a16="http://schemas.microsoft.com/office/drawing/2014/main" id="{90859AB8-41C3-41D9-9E16-49BF9A56EA60}"/>
+              </a:ext>
+            </a:extLst>
+          </p:cNvPr>
+          <p:cNvCxnSpPr/>
+          <p:nvPr/>
+        </p:nvCxnSpPr>
+        <p:spPr>
+          <a:xfrm>
+            <a:off x="784412" y="2864224"/>
+            <a:ext cx="0" cy="797858"/>
+          </a:xfrm>
+          <a:prstGeom prst="line">
+            <a:avLst/>
+          </a:prstGeom>
+          <a:ln w="76200">
+            <a:solidFill>
+              <a:schemeClr val="accent1"/>
+            </a:solidFill>
+            <a:headEnd type="none" w="med" len="med"/>
+            <a:tailEnd type="none" w="med" len="med"/>
+          </a:ln>
+        </p:spPr>
+        <p:style>
+          <a:lnRef idx="1">
+            <a:schemeClr val="accent1"/>
+          </a:lnRef>
+          <a:fillRef idx="0">
+            <a:schemeClr val="accent1"/>
+          </a:fillRef>
+          <a:effectRef idx="0">
+            <a:schemeClr val="accent1"/>
+          </a:effectRef>
+          <a:fontRef idx="minor">
+            <a:schemeClr val="tx1"/>
+          </a:fontRef>
+        </p:style>
+      </p:cxnSp>
+      <p:sp>
+        <p:nvSpPr>
+          <p:cNvPr id="9" name="Oval 8">
+            <a:extLst>
+              <a:ext uri="{FF2B5EF4-FFF2-40B4-BE49-F238E27FC236}">
+                <a16:creationId xmlns:a16="http://schemas.microsoft.com/office/drawing/2014/main" id="{C78AA28D-8121-4008-9CE3-370438566D10}"/>
+              </a:ext>
+            </a:extLst>
+          </p:cNvPr>
+          <p:cNvSpPr/>
+          <p:nvPr/>
+        </p:nvSpPr>
+        <p:spPr>
+          <a:xfrm>
+            <a:off x="3756212" y="2850776"/>
+            <a:ext cx="2061882" cy="874894"/>
+          </a:xfrm>
+          <a:prstGeom prst="ellipse">
+            <a:avLst/>
+          </a:prstGeom>
+        </p:spPr>
+        <p:style>
+          <a:lnRef idx="2">
+            <a:schemeClr val="accent1">
+              <a:shade val="50000"/>
+            </a:schemeClr>
+          </a:lnRef>
+          <a:fillRef idx="1">
+            <a:schemeClr val="accent1"/>
+          </a:fillRef>
+          <a:effectRef idx="0">
+            <a:schemeClr val="accent1"/>
+          </a:effectRef>
+          <a:fontRef idx="minor">
+            <a:schemeClr val="lt1"/>
+          </a:fontRef>
+        </p:style>
+        <p:txBody>
+          <a:bodyPr rtlCol="0" anchor="ctr"/>
+          <a:lstStyle/>
+          <a:p>
+            <a:pPr algn="ctr"/>
+            <a:r>
+              <a:rPr lang="fr-FR" dirty="0"/>
+              <a:t>{…}</a:t>
+            </a:r>
+          </a:p>
+        </p:txBody>
+      </p:sp>
+      <p:sp>
+        <p:nvSpPr>
+          <p:cNvPr id="10" name="TextBox 9">
+            <a:extLst>
+              <a:ext uri="{FF2B5EF4-FFF2-40B4-BE49-F238E27FC236}">
+                <a16:creationId xmlns:a16="http://schemas.microsoft.com/office/drawing/2014/main" id="{57BB560C-A4C9-419D-A329-22E11128F823}"/>
+              </a:ext>
+            </a:extLst>
+          </p:cNvPr>
+          <p:cNvSpPr txBox="1"/>
+          <p:nvPr/>
+        </p:nvSpPr>
+        <p:spPr>
+          <a:xfrm>
+            <a:off x="4567518" y="3908612"/>
+            <a:ext cx="595484" cy="369332"/>
+          </a:xfrm>
+          <a:prstGeom prst="rect">
+            <a:avLst/>
+          </a:prstGeom>
+          <a:noFill/>
+        </p:spPr>
+        <p:txBody>
+          <a:bodyPr wrap="none" rtlCol="0">
+            <a:spAutoFit/>
+          </a:bodyPr>
+          <a:lstStyle/>
+          <a:p>
+            <a:r>
+              <a:rPr lang="fr-FR" dirty="0" err="1"/>
+              <a:t>next</a:t>
+            </a:r>
+            <a:endParaRPr lang="fr-FR" dirty="0"/>
+          </a:p>
+        </p:txBody>
+      </p:sp>
+      <p:cxnSp>
+        <p:nvCxnSpPr>
+          <p:cNvPr id="12" name="Straight Connector 11">
+            <a:extLst>
+              <a:ext uri="{FF2B5EF4-FFF2-40B4-BE49-F238E27FC236}">
+                <a16:creationId xmlns:a16="http://schemas.microsoft.com/office/drawing/2014/main" id="{0226B3E9-21C5-4B74-AF65-C21E79B21DB8}"/>
+              </a:ext>
+            </a:extLst>
+          </p:cNvPr>
+          <p:cNvCxnSpPr/>
+          <p:nvPr/>
+        </p:nvCxnSpPr>
+        <p:spPr>
+          <a:xfrm>
+            <a:off x="5858435" y="2640106"/>
+            <a:ext cx="0" cy="1268506"/>
+          </a:xfrm>
+          <a:prstGeom prst="line">
+            <a:avLst/>
+          </a:prstGeom>
+          <a:ln w="76200">
+            <a:solidFill>
+              <a:schemeClr val="accent1"/>
+            </a:solidFill>
+            <a:headEnd type="none" w="med" len="med"/>
+            <a:tailEnd type="none" w="med" len="med"/>
+          </a:ln>
+        </p:spPr>
+        <p:style>
+          <a:lnRef idx="1">
+            <a:schemeClr val="accent1"/>
+          </a:lnRef>
+          <a:fillRef idx="0">
+            <a:schemeClr val="accent1"/>
+          </a:fillRef>
+          <a:effectRef idx="0">
+            <a:schemeClr val="accent1"/>
+          </a:effectRef>
+          <a:fontRef idx="minor">
+            <a:schemeClr val="tx1"/>
+          </a:fontRef>
+        </p:style>
+      </p:cxnSp>
+      <p:sp>
+        <p:nvSpPr>
+          <p:cNvPr id="13" name="TextBox 12">
+            <a:extLst>
+              <a:ext uri="{FF2B5EF4-FFF2-40B4-BE49-F238E27FC236}">
+                <a16:creationId xmlns:a16="http://schemas.microsoft.com/office/drawing/2014/main" id="{40FC870B-9748-4F91-8E88-2FE488F29158}"/>
+              </a:ext>
+            </a:extLst>
+          </p:cNvPr>
+          <p:cNvSpPr txBox="1"/>
+          <p:nvPr/>
+        </p:nvSpPr>
+        <p:spPr>
+          <a:xfrm>
+            <a:off x="5563258" y="3950249"/>
+            <a:ext cx="1065484" cy="369332"/>
+          </a:xfrm>
+          <a:prstGeom prst="rect">
+            <a:avLst/>
+          </a:prstGeom>
+          <a:noFill/>
+        </p:spPr>
+        <p:txBody>
+          <a:bodyPr wrap="none" rtlCol="0">
+            <a:spAutoFit/>
+          </a:bodyPr>
+          <a:lstStyle/>
+          <a:p>
+            <a:r>
+              <a:rPr lang="fr-FR" dirty="0" err="1"/>
+              <a:t>complete</a:t>
+            </a:r>
+            <a:endParaRPr lang="fr-FR" dirty="0"/>
+          </a:p>
+        </p:txBody>
+      </p:sp>
+      <p:cxnSp>
+        <p:nvCxnSpPr>
+          <p:cNvPr id="14" name="Straight Connector 13">
+            <a:extLst>
+              <a:ext uri="{FF2B5EF4-FFF2-40B4-BE49-F238E27FC236}">
+                <a16:creationId xmlns:a16="http://schemas.microsoft.com/office/drawing/2014/main" id="{5BA7D039-7E0D-4E04-9151-8DB2F7132B62}"/>
+              </a:ext>
+            </a:extLst>
+          </p:cNvPr>
+          <p:cNvCxnSpPr/>
+          <p:nvPr/>
+        </p:nvCxnSpPr>
+        <p:spPr>
+          <a:xfrm>
+            <a:off x="712694" y="4903694"/>
+            <a:ext cx="0" cy="797858"/>
+          </a:xfrm>
+          <a:prstGeom prst="line">
+            <a:avLst/>
+          </a:prstGeom>
+          <a:ln w="76200">
+            <a:solidFill>
+              <a:schemeClr val="accent1"/>
+            </a:solidFill>
+            <a:headEnd type="none" w="med" len="med"/>
+            <a:tailEnd type="none" w="med" len="med"/>
+          </a:ln>
+        </p:spPr>
+        <p:style>
+          <a:lnRef idx="1">
+            <a:schemeClr val="accent1"/>
+          </a:lnRef>
+          <a:fillRef idx="0">
+            <a:schemeClr val="accent1"/>
+          </a:fillRef>
+          <a:effectRef idx="0">
+            <a:schemeClr val="accent1"/>
+          </a:effectRef>
+          <a:fontRef idx="minor">
+            <a:schemeClr val="tx1"/>
+          </a:fontRef>
+        </p:style>
+      </p:cxnSp>
+      <p:cxnSp>
+        <p:nvCxnSpPr>
+          <p:cNvPr id="17" name="Straight Connector 16">
+            <a:extLst>
+              <a:ext uri="{FF2B5EF4-FFF2-40B4-BE49-F238E27FC236}">
+                <a16:creationId xmlns:a16="http://schemas.microsoft.com/office/drawing/2014/main" id="{DD3370AF-E8B3-426A-9A14-B37F2F4EC171}"/>
+              </a:ext>
+            </a:extLst>
+          </p:cNvPr>
+          <p:cNvCxnSpPr/>
+          <p:nvPr/>
+        </p:nvCxnSpPr>
+        <p:spPr>
+          <a:xfrm>
+            <a:off x="4567518" y="4953000"/>
+            <a:ext cx="595484" cy="748552"/>
+          </a:xfrm>
+          <a:prstGeom prst="line">
+            <a:avLst/>
+          </a:prstGeom>
+          <a:ln w="76200">
+            <a:solidFill>
+              <a:schemeClr val="accent1"/>
+            </a:solidFill>
+            <a:headEnd type="none" w="med" len="med"/>
+            <a:tailEnd type="none" w="med" len="med"/>
+          </a:ln>
+        </p:spPr>
+        <p:style>
+          <a:lnRef idx="1">
+            <a:schemeClr val="accent1"/>
+          </a:lnRef>
+          <a:fillRef idx="0">
+            <a:schemeClr val="accent1"/>
+          </a:fillRef>
+          <a:effectRef idx="0">
+            <a:schemeClr val="accent1"/>
+          </a:effectRef>
+          <a:fontRef idx="minor">
+            <a:schemeClr val="tx1"/>
+          </a:fontRef>
+        </p:style>
+      </p:cxnSp>
+      <p:cxnSp>
+        <p:nvCxnSpPr>
+          <p:cNvPr id="19" name="Straight Connector 18">
+            <a:extLst>
+              <a:ext uri="{FF2B5EF4-FFF2-40B4-BE49-F238E27FC236}">
+                <a16:creationId xmlns:a16="http://schemas.microsoft.com/office/drawing/2014/main" id="{10F5D8F0-7A69-4DF2-BDAB-2ED526AF6C1E}"/>
+              </a:ext>
+            </a:extLst>
+          </p:cNvPr>
+          <p:cNvCxnSpPr/>
+          <p:nvPr/>
+        </p:nvCxnSpPr>
+        <p:spPr>
+          <a:xfrm flipH="1">
+            <a:off x="4612341" y="4903694"/>
+            <a:ext cx="550661" cy="797858"/>
+          </a:xfrm>
+          <a:prstGeom prst="line">
+            <a:avLst/>
+          </a:prstGeom>
+          <a:ln w="76200">
+            <a:solidFill>
+              <a:schemeClr val="accent1"/>
+            </a:solidFill>
+            <a:headEnd type="none" w="med" len="med"/>
+            <a:tailEnd type="none" w="med" len="med"/>
+          </a:ln>
+        </p:spPr>
+        <p:style>
+          <a:lnRef idx="1">
+            <a:schemeClr val="accent1"/>
+          </a:lnRef>
+          <a:fillRef idx="0">
+            <a:schemeClr val="accent1"/>
+          </a:fillRef>
+          <a:effectRef idx="0">
+            <a:schemeClr val="accent1"/>
+          </a:effectRef>
+          <a:fontRef idx="minor">
+            <a:schemeClr val="tx1"/>
+          </a:fontRef>
+        </p:style>
+      </p:cxnSp>
+      <p:sp>
+        <p:nvSpPr>
+          <p:cNvPr id="20" name="TextBox 19">
+            <a:extLst>
+              <a:ext uri="{FF2B5EF4-FFF2-40B4-BE49-F238E27FC236}">
+                <a16:creationId xmlns:a16="http://schemas.microsoft.com/office/drawing/2014/main" id="{5E6F1A58-01F9-4982-AA3E-F1D6187D1865}"/>
+              </a:ext>
+            </a:extLst>
+          </p:cNvPr>
+          <p:cNvSpPr txBox="1"/>
+          <p:nvPr/>
+        </p:nvSpPr>
+        <p:spPr>
+          <a:xfrm>
+            <a:off x="4536141" y="5939118"/>
+            <a:ext cx="658642" cy="369332"/>
+          </a:xfrm>
+          <a:prstGeom prst="rect">
+            <a:avLst/>
+          </a:prstGeom>
+          <a:noFill/>
+        </p:spPr>
+        <p:txBody>
+          <a:bodyPr wrap="none" rtlCol="0">
+            <a:spAutoFit/>
+          </a:bodyPr>
+          <a:lstStyle/>
+          <a:p>
+            <a:r>
+              <a:rPr lang="fr-FR" dirty="0" err="1"/>
+              <a:t>error</a:t>
+            </a:r>
+            <a:endParaRPr lang="fr-FR" dirty="0"/>
+          </a:p>
+        </p:txBody>
+      </p:sp>
+      <p:sp>
+        <p:nvSpPr>
+          <p:cNvPr id="21" name="TextBox 20">
+            <a:extLst>
+              <a:ext uri="{FF2B5EF4-FFF2-40B4-BE49-F238E27FC236}">
+                <a16:creationId xmlns:a16="http://schemas.microsoft.com/office/drawing/2014/main" id="{63991022-A71A-4778-AA3E-416E58141675}"/>
+              </a:ext>
+            </a:extLst>
+          </p:cNvPr>
+          <p:cNvSpPr txBox="1"/>
+          <p:nvPr/>
+        </p:nvSpPr>
+        <p:spPr>
+          <a:xfrm>
+            <a:off x="5360894" y="4867835"/>
+            <a:ext cx="487634" cy="369332"/>
+          </a:xfrm>
+          <a:prstGeom prst="rect">
+            <a:avLst/>
+          </a:prstGeom>
+          <a:noFill/>
+        </p:spPr>
+        <p:txBody>
+          <a:bodyPr wrap="none" rtlCol="0">
+            <a:spAutoFit/>
+          </a:bodyPr>
+          <a:lstStyle/>
+          <a:p>
+            <a:r>
+              <a:rPr lang="fr-FR" dirty="0"/>
+              <a:t>{…}</a:t>
+            </a:r>
+          </a:p>
+        </p:txBody>
+      </p:sp>
+    </p:spTree>
+    <p:extLst>
+      <p:ext uri="{BB962C8B-B14F-4D97-AF65-F5344CB8AC3E}">
+        <p14:creationId xmlns:p14="http://schemas.microsoft.com/office/powerpoint/2010/main" val="2772134362"/>
+      </p:ext>
+    </p:extLst>
+  </p:cSld>
+  <p:clrMapOvr>
+    <a:masterClrMapping/>
+  </p:clrMapOvr>
+</p:sld>
+</file>
+
 <file path=ppt/slides/slide3.xml><?xml version="1.0" encoding="utf-8"?>
 <p:sld xmlns:a="http://schemas.openxmlformats.org/drawingml/2006/main" xmlns:r="http://schemas.openxmlformats.org/officeDocument/2006/relationships" xmlns:p="http://schemas.openxmlformats.org/presentationml/2006/main">
   <p:cSld>
@@ -9098,6 +12695,376 @@
     <p:extLst>
       <p:ext uri="{BB962C8B-B14F-4D97-AF65-F5344CB8AC3E}">
         <p14:creationId xmlns:p14="http://schemas.microsoft.com/office/powerpoint/2010/main" val="3144177021"/>
+      </p:ext>
+    </p:extLst>
+  </p:cSld>
+  <p:clrMapOvr>
+    <a:masterClrMapping/>
+  </p:clrMapOvr>
+</p:sld>
+</file>
+
+<file path=ppt/slides/slide30.xml><?xml version="1.0" encoding="utf-8"?>
+<p:sld xmlns:a="http://schemas.openxmlformats.org/drawingml/2006/main" xmlns:r="http://schemas.openxmlformats.org/officeDocument/2006/relationships" xmlns:p="http://schemas.openxmlformats.org/presentationml/2006/main">
+  <p:cSld>
+    <p:spTree>
+      <p:nvGrpSpPr>
+        <p:cNvPr id="1" name=""/>
+        <p:cNvGrpSpPr/>
+        <p:nvPr/>
+      </p:nvGrpSpPr>
+      <p:grpSpPr>
+        <a:xfrm>
+          <a:off x="0" y="0"/>
+          <a:ext cx="0" cy="0"/>
+          <a:chOff x="0" y="0"/>
+          <a:chExt cx="0" cy="0"/>
+        </a:xfrm>
+      </p:grpSpPr>
+      <p:sp>
+        <p:nvSpPr>
+          <p:cNvPr id="2" name="Title 1">
+            <a:extLst>
+              <a:ext uri="{FF2B5EF4-FFF2-40B4-BE49-F238E27FC236}">
+                <a16:creationId xmlns:a16="http://schemas.microsoft.com/office/drawing/2014/main" id="{A90B96FA-0113-4547-A22E-600928106E81}"/>
+              </a:ext>
+            </a:extLst>
+          </p:cNvPr>
+          <p:cNvSpPr>
+            <a:spLocks noGrp="1"/>
+          </p:cNvSpPr>
+          <p:nvPr>
+            <p:ph type="title"/>
+          </p:nvPr>
+        </p:nvSpPr>
+        <p:spPr/>
+        <p:txBody>
+          <a:bodyPr/>
+          <a:lstStyle/>
+          <a:p>
+            <a:r>
+              <a:rPr lang="fr-FR" dirty="0"/>
+              <a:t>Directive</a:t>
+            </a:r>
+          </a:p>
+        </p:txBody>
+      </p:sp>
+      <p:pic>
+        <p:nvPicPr>
+          <p:cNvPr id="5" name="Picture 4">
+            <a:extLst>
+              <a:ext uri="{FF2B5EF4-FFF2-40B4-BE49-F238E27FC236}">
+                <a16:creationId xmlns:a16="http://schemas.microsoft.com/office/drawing/2014/main" id="{F3D13ED0-EADF-495E-A441-A9A9BAE01241}"/>
+              </a:ext>
+            </a:extLst>
+          </p:cNvPr>
+          <p:cNvPicPr>
+            <a:picLocks noChangeAspect="1"/>
+          </p:cNvPicPr>
+          <p:nvPr/>
+        </p:nvPicPr>
+        <p:blipFill>
+          <a:blip r:embed="rId2"/>
+          <a:stretch>
+            <a:fillRect/>
+          </a:stretch>
+        </p:blipFill>
+        <p:spPr>
+          <a:xfrm>
+            <a:off x="880532" y="1592932"/>
+            <a:ext cx="7349067" cy="3844845"/>
+          </a:xfrm>
+          <a:prstGeom prst="rect">
+            <a:avLst/>
+          </a:prstGeom>
+        </p:spPr>
+      </p:pic>
+    </p:spTree>
+    <p:extLst>
+      <p:ext uri="{BB962C8B-B14F-4D97-AF65-F5344CB8AC3E}">
+        <p14:creationId xmlns:p14="http://schemas.microsoft.com/office/powerpoint/2010/main" val="2920808062"/>
+      </p:ext>
+    </p:extLst>
+  </p:cSld>
+  <p:clrMapOvr>
+    <a:masterClrMapping/>
+  </p:clrMapOvr>
+</p:sld>
+</file>
+
+<file path=ppt/slides/slide31.xml><?xml version="1.0" encoding="utf-8"?>
+<p:sld xmlns:a="http://schemas.openxmlformats.org/drawingml/2006/main" xmlns:r="http://schemas.openxmlformats.org/officeDocument/2006/relationships" xmlns:p="http://schemas.openxmlformats.org/presentationml/2006/main">
+  <p:cSld>
+    <p:spTree>
+      <p:nvGrpSpPr>
+        <p:cNvPr id="1" name=""/>
+        <p:cNvGrpSpPr/>
+        <p:nvPr/>
+      </p:nvGrpSpPr>
+      <p:grpSpPr>
+        <a:xfrm>
+          <a:off x="0" y="0"/>
+          <a:ext cx="0" cy="0"/>
+          <a:chOff x="0" y="0"/>
+          <a:chExt cx="0" cy="0"/>
+        </a:xfrm>
+      </p:grpSpPr>
+      <p:sp>
+        <p:nvSpPr>
+          <p:cNvPr id="2" name="Title 1">
+            <a:extLst>
+              <a:ext uri="{FF2B5EF4-FFF2-40B4-BE49-F238E27FC236}">
+                <a16:creationId xmlns:a16="http://schemas.microsoft.com/office/drawing/2014/main" id="{28F96B7F-7BE3-4342-AB4C-D963229E1B28}"/>
+              </a:ext>
+            </a:extLst>
+          </p:cNvPr>
+          <p:cNvSpPr>
+            <a:spLocks noGrp="1"/>
+          </p:cNvSpPr>
+          <p:nvPr>
+            <p:ph type="title"/>
+          </p:nvPr>
+        </p:nvSpPr>
+        <p:spPr/>
+        <p:txBody>
+          <a:bodyPr/>
+          <a:lstStyle/>
+          <a:p>
+            <a:r>
+              <a:rPr lang="fr-FR" dirty="0" err="1"/>
+              <a:t>Ng</a:t>
+            </a:r>
+            <a:r>
+              <a:rPr lang="fr-FR" dirty="0"/>
+              <a:t> test</a:t>
+            </a:r>
+          </a:p>
+        </p:txBody>
+      </p:sp>
+      <p:sp>
+        <p:nvSpPr>
+          <p:cNvPr id="3" name="Content Placeholder 2">
+            <a:extLst>
+              <a:ext uri="{FF2B5EF4-FFF2-40B4-BE49-F238E27FC236}">
+                <a16:creationId xmlns:a16="http://schemas.microsoft.com/office/drawing/2014/main" id="{99F8D683-CFD9-45E7-B9DC-03DE39DA91C1}"/>
+              </a:ext>
+            </a:extLst>
+          </p:cNvPr>
+          <p:cNvSpPr>
+            <a:spLocks noGrp="1"/>
+          </p:cNvSpPr>
+          <p:nvPr>
+            <p:ph idx="1"/>
+          </p:nvPr>
+        </p:nvSpPr>
+        <p:spPr/>
+        <p:txBody>
+          <a:bodyPr/>
+          <a:lstStyle/>
+          <a:p>
+            <a:r>
+              <a:rPr lang="fr-FR" dirty="0"/>
+              <a:t>1</a:t>
+            </a:r>
+            <a:r>
+              <a:rPr lang="fr-FR" baseline="30000" dirty="0"/>
+              <a:t>er</a:t>
+            </a:r>
+            <a:r>
+              <a:rPr lang="fr-FR" dirty="0"/>
+              <a:t> phase : avoir des tests qui marchent (pas d’erreur)</a:t>
+            </a:r>
+          </a:p>
+          <a:p>
+            <a:pPr lvl="1"/>
+            <a:r>
+              <a:rPr lang="fr-FR" dirty="0" err="1"/>
+              <a:t>Ng</a:t>
+            </a:r>
+            <a:r>
+              <a:rPr lang="fr-FR" dirty="0"/>
+              <a:t> test retourne 0 </a:t>
+            </a:r>
+            <a:r>
+              <a:rPr lang="fr-FR" dirty="0" err="1"/>
+              <a:t>failures</a:t>
+            </a:r>
+            <a:r>
+              <a:rPr lang="fr-FR" dirty="0"/>
+              <a:t>.</a:t>
+            </a:r>
+          </a:p>
+          <a:p>
+            <a:r>
+              <a:rPr lang="fr-FR" dirty="0"/>
+              <a:t>2</a:t>
+            </a:r>
+            <a:r>
+              <a:rPr lang="fr-FR" baseline="30000" dirty="0"/>
+              <a:t>ème</a:t>
+            </a:r>
+            <a:r>
+              <a:rPr lang="fr-FR" dirty="0"/>
+              <a:t> phase : avoir des tests qui couvrent un maximum de code.</a:t>
+            </a:r>
+          </a:p>
+          <a:p>
+            <a:r>
+              <a:rPr lang="fr-FR" dirty="0"/>
+              <a:t>3</a:t>
+            </a:r>
+            <a:r>
+              <a:rPr lang="fr-FR" baseline="30000" dirty="0"/>
+              <a:t>ème</a:t>
+            </a:r>
+            <a:r>
+              <a:rPr lang="fr-FR" dirty="0"/>
+              <a:t> phase : avoir des tests qui satisfont le métier.</a:t>
+            </a:r>
+          </a:p>
+        </p:txBody>
+      </p:sp>
+    </p:spTree>
+    <p:extLst>
+      <p:ext uri="{BB962C8B-B14F-4D97-AF65-F5344CB8AC3E}">
+        <p14:creationId xmlns:p14="http://schemas.microsoft.com/office/powerpoint/2010/main" val="3421583670"/>
+      </p:ext>
+    </p:extLst>
+  </p:cSld>
+  <p:clrMapOvr>
+    <a:masterClrMapping/>
+  </p:clrMapOvr>
+</p:sld>
+</file>
+
+<file path=ppt/slides/slide32.xml><?xml version="1.0" encoding="utf-8"?>
+<p:sld xmlns:a="http://schemas.openxmlformats.org/drawingml/2006/main" xmlns:r="http://schemas.openxmlformats.org/officeDocument/2006/relationships" xmlns:p="http://schemas.openxmlformats.org/presentationml/2006/main">
+  <p:cSld>
+    <p:spTree>
+      <p:nvGrpSpPr>
+        <p:cNvPr id="1" name=""/>
+        <p:cNvGrpSpPr/>
+        <p:nvPr/>
+      </p:nvGrpSpPr>
+      <p:grpSpPr>
+        <a:xfrm>
+          <a:off x="0" y="0"/>
+          <a:ext cx="0" cy="0"/>
+          <a:chOff x="0" y="0"/>
+          <a:chExt cx="0" cy="0"/>
+        </a:xfrm>
+      </p:grpSpPr>
+      <p:sp>
+        <p:nvSpPr>
+          <p:cNvPr id="2" name="Title 1">
+            <a:extLst>
+              <a:ext uri="{FF2B5EF4-FFF2-40B4-BE49-F238E27FC236}">
+                <a16:creationId xmlns:a16="http://schemas.microsoft.com/office/drawing/2014/main" id="{D861B171-C7CE-4F08-86E3-22E97907BBE8}"/>
+              </a:ext>
+            </a:extLst>
+          </p:cNvPr>
+          <p:cNvSpPr>
+            <a:spLocks noGrp="1"/>
+          </p:cNvSpPr>
+          <p:nvPr>
+            <p:ph type="title"/>
+          </p:nvPr>
+        </p:nvSpPr>
+        <p:spPr/>
+        <p:txBody>
+          <a:bodyPr/>
+          <a:lstStyle/>
+          <a:p>
+            <a:r>
+              <a:rPr lang="fr-FR" dirty="0" err="1"/>
+              <a:t>Ng</a:t>
+            </a:r>
+            <a:r>
+              <a:rPr lang="fr-FR" dirty="0"/>
+              <a:t> e2e avec proxy</a:t>
+            </a:r>
+          </a:p>
+        </p:txBody>
+      </p:sp>
+      <p:sp>
+        <p:nvSpPr>
+          <p:cNvPr id="3" name="Content Placeholder 2">
+            <a:extLst>
+              <a:ext uri="{FF2B5EF4-FFF2-40B4-BE49-F238E27FC236}">
+                <a16:creationId xmlns:a16="http://schemas.microsoft.com/office/drawing/2014/main" id="{26D9E46A-88B4-4E2F-AB5F-88B96285E830}"/>
+              </a:ext>
+            </a:extLst>
+          </p:cNvPr>
+          <p:cNvSpPr>
+            <a:spLocks noGrp="1"/>
+          </p:cNvSpPr>
+          <p:nvPr>
+            <p:ph idx="1"/>
+          </p:nvPr>
+        </p:nvSpPr>
+        <p:spPr/>
+        <p:txBody>
+          <a:bodyPr/>
+          <a:lstStyle/>
+          <a:p>
+            <a:r>
+              <a:rPr lang="fr-FR" dirty="0">
+                <a:hlinkClick r:id="rId2"/>
+              </a:rPr>
+              <a:t>https://stackoverflow.com/questions/45733761/webdriver-manager-not-working-behind-proxy</a:t>
+            </a:r>
+            <a:endParaRPr lang="fr-FR" dirty="0"/>
+          </a:p>
+          <a:p>
+            <a:r>
+              <a:rPr lang="fr-FR" dirty="0" err="1"/>
+              <a:t>npx</a:t>
+            </a:r>
+            <a:r>
+              <a:rPr lang="fr-FR" dirty="0"/>
+              <a:t> </a:t>
+            </a:r>
+            <a:r>
+              <a:rPr lang="fr-FR" dirty="0" err="1"/>
+              <a:t>webdriver</a:t>
+            </a:r>
+            <a:r>
+              <a:rPr lang="fr-FR" dirty="0"/>
+              <a:t>-manager update --proxy=http://someproxy:8080 --</a:t>
+            </a:r>
+            <a:r>
+              <a:rPr lang="fr-FR" dirty="0" err="1"/>
+              <a:t>ignore_ssl</a:t>
+            </a:r>
+            <a:endParaRPr lang="fr-FR" dirty="0"/>
+          </a:p>
+          <a:p>
+            <a:r>
+              <a:rPr lang="fr-FR" dirty="0" err="1"/>
+              <a:t>ng</a:t>
+            </a:r>
+            <a:r>
+              <a:rPr lang="fr-FR" dirty="0"/>
+              <a:t> e2e </a:t>
+            </a:r>
+            <a:r>
+              <a:rPr lang="fr-FR" dirty="0" err="1"/>
+              <a:t>webdriver</a:t>
+            </a:r>
+            <a:r>
+              <a:rPr lang="fr-FR" dirty="0"/>
+              <a:t>-update=false</a:t>
+            </a:r>
+          </a:p>
+          <a:p>
+            <a:endParaRPr lang="fr-FR" dirty="0"/>
+          </a:p>
+        </p:txBody>
+      </p:sp>
+    </p:spTree>
+    <p:extLst>
+      <p:ext uri="{BB962C8B-B14F-4D97-AF65-F5344CB8AC3E}">
+        <p14:creationId xmlns:p14="http://schemas.microsoft.com/office/powerpoint/2010/main" val="816686962"/>
       </p:ext>
     </p:extLst>
   </p:cSld>

</xml_diff>